<commit_message>
Introduction to Spring Testing Support
</commit_message>
<xml_diff>
--- a/presentations/Introduction to Spring Framework Testing.pptx
+++ b/presentations/Introduction to Spring Framework Testing.pptx
@@ -267,7 +267,7 @@
           <a:p>
             <a:fld id="{B38EF465-D677-F140-82CD-891C0463380E}" type="datetimeFigureOut">
               <a:rPr lang="en-US" smtClean="0"/>
-              <a:t>8/8/21</a:t>
+              <a:t>10/26/21</a:t>
             </a:fld>
             <a:endParaRPr lang="en-US"/>
           </a:p>
@@ -465,7 +465,7 @@
           <a:p>
             <a:fld id="{B38EF465-D677-F140-82CD-891C0463380E}" type="datetimeFigureOut">
               <a:rPr lang="en-US" smtClean="0"/>
-              <a:t>8/8/21</a:t>
+              <a:t>10/26/21</a:t>
             </a:fld>
             <a:endParaRPr lang="en-US"/>
           </a:p>
@@ -673,7 +673,7 @@
           <a:p>
             <a:fld id="{B38EF465-D677-F140-82CD-891C0463380E}" type="datetimeFigureOut">
               <a:rPr lang="en-US" smtClean="0"/>
-              <a:t>8/8/21</a:t>
+              <a:t>10/26/21</a:t>
             </a:fld>
             <a:endParaRPr lang="en-US"/>
           </a:p>
@@ -871,7 +871,7 @@
           <a:p>
             <a:fld id="{B38EF465-D677-F140-82CD-891C0463380E}" type="datetimeFigureOut">
               <a:rPr lang="en-US" smtClean="0"/>
-              <a:t>8/8/21</a:t>
+              <a:t>10/26/21</a:t>
             </a:fld>
             <a:endParaRPr lang="en-US"/>
           </a:p>
@@ -1146,7 +1146,7 @@
           <a:p>
             <a:fld id="{B38EF465-D677-F140-82CD-891C0463380E}" type="datetimeFigureOut">
               <a:rPr lang="en-US" smtClean="0"/>
-              <a:t>8/8/21</a:t>
+              <a:t>10/26/21</a:t>
             </a:fld>
             <a:endParaRPr lang="en-US"/>
           </a:p>
@@ -1411,7 +1411,7 @@
           <a:p>
             <a:fld id="{B38EF465-D677-F140-82CD-891C0463380E}" type="datetimeFigureOut">
               <a:rPr lang="en-US" smtClean="0"/>
-              <a:t>8/8/21</a:t>
+              <a:t>10/26/21</a:t>
             </a:fld>
             <a:endParaRPr lang="en-US"/>
           </a:p>
@@ -1823,7 +1823,7 @@
           <a:p>
             <a:fld id="{B38EF465-D677-F140-82CD-891C0463380E}" type="datetimeFigureOut">
               <a:rPr lang="en-US" smtClean="0"/>
-              <a:t>8/8/21</a:t>
+              <a:t>10/26/21</a:t>
             </a:fld>
             <a:endParaRPr lang="en-US"/>
           </a:p>
@@ -1964,7 +1964,7 @@
           <a:p>
             <a:fld id="{B38EF465-D677-F140-82CD-891C0463380E}" type="datetimeFigureOut">
               <a:rPr lang="en-US" smtClean="0"/>
-              <a:t>8/8/21</a:t>
+              <a:t>10/26/21</a:t>
             </a:fld>
             <a:endParaRPr lang="en-US"/>
           </a:p>
@@ -2077,7 +2077,7 @@
           <a:p>
             <a:fld id="{B38EF465-D677-F140-82CD-891C0463380E}" type="datetimeFigureOut">
               <a:rPr lang="en-US" smtClean="0"/>
-              <a:t>8/8/21</a:t>
+              <a:t>10/26/21</a:t>
             </a:fld>
             <a:endParaRPr lang="en-US"/>
           </a:p>
@@ -2388,7 +2388,7 @@
           <a:p>
             <a:fld id="{B38EF465-D677-F140-82CD-891C0463380E}" type="datetimeFigureOut">
               <a:rPr lang="en-US" smtClean="0"/>
-              <a:t>8/8/21</a:t>
+              <a:t>10/26/21</a:t>
             </a:fld>
             <a:endParaRPr lang="en-US"/>
           </a:p>
@@ -2676,7 +2676,7 @@
           <a:p>
             <a:fld id="{B38EF465-D677-F140-82CD-891C0463380E}" type="datetimeFigureOut">
               <a:rPr lang="en-US" smtClean="0"/>
-              <a:t>8/8/21</a:t>
+              <a:t>10/26/21</a:t>
             </a:fld>
             <a:endParaRPr lang="en-US"/>
           </a:p>
@@ -2917,7 +2917,7 @@
           <a:p>
             <a:fld id="{B38EF465-D677-F140-82CD-891C0463380E}" type="datetimeFigureOut">
               <a:rPr lang="en-US" smtClean="0"/>
-              <a:t>8/8/21</a:t>
+              <a:t>10/26/21</a:t>
             </a:fld>
             <a:endParaRPr lang="en-US"/>
           </a:p>
@@ -3356,12 +3356,8 @@
           <a:lstStyle/>
           <a:p>
             <a:r>
-              <a:rPr lang="en-US"/>
-              <a:t>Mockito </a:t>
-            </a:r>
-            <a:r>
               <a:rPr lang="en-US" dirty="0"/>
-              <a:t>Framework</a:t>
+              <a:t>Introduction to Spring Testing Support</a:t>
             </a:r>
           </a:p>
         </p:txBody>
@@ -3445,7 +3441,10 @@
           <a:bodyPr/>
           <a:lstStyle/>
           <a:p>
-            <a:endParaRPr lang="en-US"/>
+            <a:r>
+              <a:rPr lang="en-US" dirty="0"/>
+              <a:t>Mock Environment support</a:t>
+            </a:r>
           </a:p>
         </p:txBody>
       </p:sp>
@@ -3470,7 +3469,69 @@
           <a:bodyPr/>
           <a:lstStyle/>
           <a:p>
-            <a:endParaRPr lang="en-US"/>
+            <a:r>
+              <a:rPr lang="en-US" dirty="0"/>
+              <a:t>The </a:t>
+            </a:r>
+            <a:r>
+              <a:rPr lang="en-US" dirty="0" err="1">
+                <a:latin typeface="Courier" pitchFamily="2" charset="0"/>
+              </a:rPr>
+              <a:t>org.springframework.mock.env</a:t>
+            </a:r>
+            <a:r>
+              <a:rPr lang="en-US" dirty="0">
+                <a:latin typeface="Courier" pitchFamily="2" charset="0"/>
+              </a:rPr>
+              <a:t> </a:t>
+            </a:r>
+            <a:r>
+              <a:rPr lang="en-US" dirty="0"/>
+              <a:t>package contains mock implementations of the </a:t>
+            </a:r>
+            <a:r>
+              <a:rPr lang="en-US" dirty="0">
+                <a:latin typeface="Courier" pitchFamily="2" charset="0"/>
+              </a:rPr>
+              <a:t>Environment</a:t>
+            </a:r>
+            <a:r>
+              <a:rPr lang="en-US" dirty="0"/>
+              <a:t> and </a:t>
+            </a:r>
+            <a:r>
+              <a:rPr lang="en-US" dirty="0" err="1">
+                <a:latin typeface="Courier" pitchFamily="2" charset="0"/>
+              </a:rPr>
+              <a:t>PropertySource</a:t>
+            </a:r>
+            <a:r>
+              <a:rPr lang="en-US" dirty="0"/>
+              <a:t> abstractions. </a:t>
+            </a:r>
+          </a:p>
+          <a:p>
+            <a:pPr lvl="1"/>
+            <a:r>
+              <a:rPr lang="en-US" dirty="0" err="1">
+                <a:latin typeface="Courier" pitchFamily="2" charset="0"/>
+              </a:rPr>
+              <a:t>MockEnvironment</a:t>
+            </a:r>
+            <a:r>
+              <a:rPr lang="en-US" dirty="0"/>
+              <a:t> and </a:t>
+            </a:r>
+            <a:r>
+              <a:rPr lang="en-US" dirty="0" err="1">
+                <a:latin typeface="Courier" pitchFamily="2" charset="0"/>
+              </a:rPr>
+              <a:t>MockPropertySource</a:t>
+            </a:r>
+            <a:r>
+              <a:rPr lang="en-US" dirty="0"/>
+              <a:t> are useful for developing out-of-container tests for code that depends on environment-specific properties.</a:t>
+            </a:r>
           </a:p>
         </p:txBody>
       </p:sp>
@@ -3525,7 +3586,10 @@
           <a:bodyPr/>
           <a:lstStyle/>
           <a:p>
-            <a:endParaRPr lang="en-US"/>
+            <a:r>
+              <a:rPr lang="en-US" dirty="0"/>
+              <a:t>Mock Servlet API support</a:t>
+            </a:r>
           </a:p>
         </p:txBody>
       </p:sp>
@@ -3547,10 +3611,73 @@
         </p:nvSpPr>
         <p:spPr/>
         <p:txBody>
-          <a:bodyPr/>
-          <a:lstStyle/>
-          <a:p>
-            <a:endParaRPr lang="en-US"/>
+          <a:bodyPr>
+            <a:normAutofit/>
+          </a:bodyPr>
+          <a:lstStyle/>
+          <a:p>
+            <a:r>
+              <a:rPr lang="en-US" dirty="0"/>
+              <a:t>The </a:t>
+            </a:r>
+            <a:r>
+              <a:rPr lang="en-US" dirty="0" err="1">
+                <a:latin typeface="Courier" pitchFamily="2" charset="0"/>
+              </a:rPr>
+              <a:t>org.springframework.mock.web</a:t>
+            </a:r>
+            <a:r>
+              <a:rPr lang="en-US" dirty="0">
+                <a:latin typeface="Courier" pitchFamily="2" charset="0"/>
+              </a:rPr>
+              <a:t> </a:t>
+            </a:r>
+            <a:r>
+              <a:rPr lang="en-US" dirty="0"/>
+              <a:t>package contains a comprehensive set of Servlet API mock objects.</a:t>
+            </a:r>
+          </a:p>
+          <a:p>
+            <a:pPr lvl="1"/>
+            <a:r>
+              <a:rPr lang="en-US" dirty="0"/>
+              <a:t>Useful for testing web contexts, controllers and filters. </a:t>
+            </a:r>
+          </a:p>
+          <a:p>
+            <a:pPr lvl="1"/>
+            <a:r>
+              <a:rPr lang="en-US" dirty="0"/>
+              <a:t>These mock objects are targeted at usage with Spring’s Web MVC framework.</a:t>
+            </a:r>
+          </a:p>
+          <a:p>
+            <a:r>
+              <a:rPr lang="en-US" dirty="0"/>
+              <a:t>Since Spring Framework 5.0, these mock objects are based on the Servlet 4.0 API.</a:t>
+            </a:r>
+          </a:p>
+          <a:p>
+            <a:r>
+              <a:rPr lang="en-US" dirty="0"/>
+              <a:t>The Spring MVC Test Framework (</a:t>
+            </a:r>
+            <a:r>
+              <a:rPr lang="en-US" i="1" dirty="0"/>
+              <a:t>aka</a:t>
+            </a:r>
+            <a:r>
+              <a:rPr lang="en-US" dirty="0"/>
+              <a:t> </a:t>
+            </a:r>
+            <a:r>
+              <a:rPr lang="en-US" dirty="0" err="1"/>
+              <a:t>MockMvc</a:t>
+            </a:r>
+            <a:r>
+              <a:rPr lang="en-US" dirty="0"/>
+              <a:t>) builds on the mock Servlet API objects to provide an integration testing framework for Spring MVC.</a:t>
+            </a:r>
           </a:p>
         </p:txBody>
       </p:sp>
@@ -3605,7 +3732,18 @@
           <a:bodyPr/>
           <a:lstStyle/>
           <a:p>
-            <a:endParaRPr lang="en-US"/>
+            <a:r>
+              <a:rPr lang="en-US" dirty="0"/>
+              <a:t>Spring MVC Test framework (aka </a:t>
+            </a:r>
+            <a:r>
+              <a:rPr lang="en-US" dirty="0" err="1"/>
+              <a:t>MockMvc</a:t>
+            </a:r>
+            <a:r>
+              <a:rPr lang="en-US" dirty="0"/>
+              <a:t>)</a:t>
+            </a:r>
           </a:p>
         </p:txBody>
       </p:sp>
@@ -3627,10 +3765,74 @@
         </p:nvSpPr>
         <p:spPr/>
         <p:txBody>
-          <a:bodyPr/>
-          <a:lstStyle/>
-          <a:p>
-            <a:endParaRPr lang="en-US"/>
+          <a:bodyPr>
+            <a:normAutofit/>
+          </a:bodyPr>
+          <a:lstStyle/>
+          <a:p>
+            <a:r>
+              <a:rPr lang="en-US" dirty="0"/>
+              <a:t>Provides support for testing Spring MVC applications. </a:t>
+            </a:r>
+          </a:p>
+          <a:p>
+            <a:pPr lvl="1"/>
+            <a:r>
+              <a:rPr lang="en-US" dirty="0"/>
+              <a:t>It performs full Spring MVC request handling but via mock request and response objects instead of a running server.</a:t>
+            </a:r>
+          </a:p>
+          <a:p>
+            <a:r>
+              <a:rPr lang="en-US" dirty="0" err="1"/>
+              <a:t>MockMvc</a:t>
+            </a:r>
+            <a:r>
+              <a:rPr lang="en-US" dirty="0"/>
+              <a:t> can be used on its own to perform requests and verify responses. </a:t>
+            </a:r>
+          </a:p>
+          <a:p>
+            <a:r>
+              <a:rPr lang="en-US" dirty="0"/>
+              <a:t>It can also be used through the </a:t>
+            </a:r>
+            <a:r>
+              <a:rPr lang="en-US" dirty="0" err="1"/>
+              <a:t>WebTestClient</a:t>
+            </a:r>
+            <a:r>
+              <a:rPr lang="en-US" dirty="0"/>
+              <a:t> where </a:t>
+            </a:r>
+            <a:r>
+              <a:rPr lang="en-US" dirty="0" err="1"/>
+              <a:t>MockMvc</a:t>
+            </a:r>
+            <a:r>
+              <a:rPr lang="en-US" dirty="0"/>
+              <a:t> is plugged in as the server to handle requests with. </a:t>
+            </a:r>
+          </a:p>
+          <a:p>
+            <a:pPr lvl="1"/>
+            <a:r>
+              <a:rPr lang="en-US" dirty="0"/>
+              <a:t>Advantage: The option to work with higher level objects instead of raw data.</a:t>
+            </a:r>
+          </a:p>
+          <a:p>
+            <a:pPr lvl="1"/>
+            <a:r>
+              <a:rPr lang="en-US" dirty="0"/>
+              <a:t>Advantage: Use full, end-to-end HTTP tests against a live server and use the same test API.</a:t>
+            </a:r>
+          </a:p>
+          <a:p>
+            <a:endParaRPr lang="en-US" dirty="0"/>
+          </a:p>
+          <a:p>
+            <a:endParaRPr lang="en-US" dirty="0"/>
           </a:p>
         </p:txBody>
       </p:sp>
@@ -3685,7 +3887,14 @@
           <a:bodyPr/>
           <a:lstStyle/>
           <a:p>
-            <a:endParaRPr lang="en-US"/>
+            <a:r>
+              <a:rPr lang="en-US" dirty="0" err="1"/>
+              <a:t>MockMvc</a:t>
+            </a:r>
+            <a:r>
+              <a:rPr lang="en-US" dirty="0"/>
+              <a:t> Details</a:t>
+            </a:r>
           </a:p>
         </p:txBody>
       </p:sp>
@@ -3710,7 +3919,40 @@
           <a:bodyPr/>
           <a:lstStyle/>
           <a:p>
-            <a:endParaRPr lang="en-US"/>
+            <a:r>
+              <a:rPr lang="en-US" dirty="0"/>
+              <a:t>Invokes the </a:t>
+            </a:r>
+            <a:r>
+              <a:rPr lang="en-US" dirty="0" err="1">
+                <a:latin typeface="Courier" pitchFamily="2" charset="0"/>
+              </a:rPr>
+              <a:t>DispacherServlet</a:t>
+            </a:r>
+            <a:r>
+              <a:rPr lang="en-US" dirty="0"/>
+              <a:t>, passing mock implementations of the Servlet API from the spring-test module.</a:t>
+            </a:r>
+          </a:p>
+          <a:p>
+            <a:pPr lvl="1"/>
+            <a:r>
+              <a:rPr lang="en-US" dirty="0"/>
+              <a:t>Replicates the full Spring MVC request handling without a running server.</a:t>
+            </a:r>
+          </a:p>
+          <a:p>
+            <a:r>
+              <a:rPr lang="en-US" dirty="0" err="1"/>
+              <a:t>MockMvc</a:t>
+            </a:r>
+            <a:r>
+              <a:rPr lang="en-US" dirty="0"/>
+              <a:t> is a server-side test framework that lets you verify most of the functionality of a Spring MVC application using lightweight and targeted tests. </a:t>
+            </a:r>
+          </a:p>
+          <a:p>
+            <a:endParaRPr lang="en-US" dirty="0"/>
           </a:p>
         </p:txBody>
       </p:sp>

</xml_diff>

<commit_message>
Updates to Spring testing presentation
</commit_message>
<xml_diff>
--- a/presentations/Introduction to Spring Framework Testing.pptx
+++ b/presentations/Introduction to Spring Framework Testing.pptx
@@ -12,8 +12,12 @@
     <p:sldId id="260" r:id="rId6"/>
     <p:sldId id="261" r:id="rId7"/>
     <p:sldId id="262" r:id="rId8"/>
-    <p:sldId id="263" r:id="rId9"/>
-    <p:sldId id="264" r:id="rId10"/>
+    <p:sldId id="265" r:id="rId9"/>
+    <p:sldId id="266" r:id="rId10"/>
+    <p:sldId id="267" r:id="rId11"/>
+    <p:sldId id="268" r:id="rId12"/>
+    <p:sldId id="263" r:id="rId13"/>
+    <p:sldId id="264" r:id="rId14"/>
   </p:sldIdLst>
   <p:sldSz cx="12192000" cy="6858000"/>
   <p:notesSz cx="6858000" cy="9144000"/>
@@ -3403,6 +3407,326 @@
 </p:sld>
 </file>
 
+<file path=ppt/slides/slide10.xml><?xml version="1.0" encoding="utf-8"?>
+<p:sld xmlns:a="http://schemas.openxmlformats.org/drawingml/2006/main" xmlns:r="http://schemas.openxmlformats.org/officeDocument/2006/relationships" xmlns:p="http://schemas.openxmlformats.org/presentationml/2006/main">
+  <p:cSld>
+    <p:spTree>
+      <p:nvGrpSpPr>
+        <p:cNvPr id="1" name=""/>
+        <p:cNvGrpSpPr/>
+        <p:nvPr/>
+      </p:nvGrpSpPr>
+      <p:grpSpPr>
+        <a:xfrm>
+          <a:off x="0" y="0"/>
+          <a:ext cx="0" cy="0"/>
+          <a:chOff x="0" y="0"/>
+          <a:chExt cx="0" cy="0"/>
+        </a:xfrm>
+      </p:grpSpPr>
+      <p:sp>
+        <p:nvSpPr>
+          <p:cNvPr id="2" name="Title 1">
+            <a:extLst>
+              <a:ext uri="{FF2B5EF4-FFF2-40B4-BE49-F238E27FC236}">
+                <a16:creationId xmlns:a16="http://schemas.microsoft.com/office/drawing/2014/main" id="{0721C84B-4C4A-C94C-8F18-7F1C16D2A1F4}"/>
+              </a:ext>
+            </a:extLst>
+          </p:cNvPr>
+          <p:cNvSpPr>
+            <a:spLocks noGrp="1"/>
+          </p:cNvSpPr>
+          <p:nvPr>
+            <p:ph type="title"/>
+          </p:nvPr>
+        </p:nvSpPr>
+        <p:spPr/>
+        <p:txBody>
+          <a:bodyPr/>
+          <a:lstStyle/>
+          <a:p>
+            <a:endParaRPr lang="en-US"/>
+          </a:p>
+        </p:txBody>
+      </p:sp>
+      <p:sp>
+        <p:nvSpPr>
+          <p:cNvPr id="3" name="Content Placeholder 2">
+            <a:extLst>
+              <a:ext uri="{FF2B5EF4-FFF2-40B4-BE49-F238E27FC236}">
+                <a16:creationId xmlns:a16="http://schemas.microsoft.com/office/drawing/2014/main" id="{145FAC0A-9F40-C942-9675-DED9A8D58FF7}"/>
+              </a:ext>
+            </a:extLst>
+          </p:cNvPr>
+          <p:cNvSpPr>
+            <a:spLocks noGrp="1"/>
+          </p:cNvSpPr>
+          <p:nvPr>
+            <p:ph idx="1"/>
+          </p:nvPr>
+        </p:nvSpPr>
+        <p:spPr/>
+        <p:txBody>
+          <a:bodyPr/>
+          <a:lstStyle/>
+          <a:p>
+            <a:endParaRPr lang="en-US"/>
+          </a:p>
+        </p:txBody>
+      </p:sp>
+    </p:spTree>
+    <p:extLst>
+      <p:ext uri="{BB962C8B-B14F-4D97-AF65-F5344CB8AC3E}">
+        <p14:creationId xmlns:p14="http://schemas.microsoft.com/office/powerpoint/2010/main" val="82220067"/>
+      </p:ext>
+    </p:extLst>
+  </p:cSld>
+  <p:clrMapOvr>
+    <a:masterClrMapping/>
+  </p:clrMapOvr>
+</p:sld>
+</file>
+
+<file path=ppt/slides/slide11.xml><?xml version="1.0" encoding="utf-8"?>
+<p:sld xmlns:a="http://schemas.openxmlformats.org/drawingml/2006/main" xmlns:r="http://schemas.openxmlformats.org/officeDocument/2006/relationships" xmlns:p="http://schemas.openxmlformats.org/presentationml/2006/main">
+  <p:cSld>
+    <p:spTree>
+      <p:nvGrpSpPr>
+        <p:cNvPr id="1" name=""/>
+        <p:cNvGrpSpPr/>
+        <p:nvPr/>
+      </p:nvGrpSpPr>
+      <p:grpSpPr>
+        <a:xfrm>
+          <a:off x="0" y="0"/>
+          <a:ext cx="0" cy="0"/>
+          <a:chOff x="0" y="0"/>
+          <a:chExt cx="0" cy="0"/>
+        </a:xfrm>
+      </p:grpSpPr>
+      <p:sp>
+        <p:nvSpPr>
+          <p:cNvPr id="2" name="Title 1">
+            <a:extLst>
+              <a:ext uri="{FF2B5EF4-FFF2-40B4-BE49-F238E27FC236}">
+                <a16:creationId xmlns:a16="http://schemas.microsoft.com/office/drawing/2014/main" id="{0721C84B-4C4A-C94C-8F18-7F1C16D2A1F4}"/>
+              </a:ext>
+            </a:extLst>
+          </p:cNvPr>
+          <p:cNvSpPr>
+            <a:spLocks noGrp="1"/>
+          </p:cNvSpPr>
+          <p:nvPr>
+            <p:ph type="title"/>
+          </p:nvPr>
+        </p:nvSpPr>
+        <p:spPr/>
+        <p:txBody>
+          <a:bodyPr/>
+          <a:lstStyle/>
+          <a:p>
+            <a:endParaRPr lang="en-US"/>
+          </a:p>
+        </p:txBody>
+      </p:sp>
+      <p:sp>
+        <p:nvSpPr>
+          <p:cNvPr id="3" name="Content Placeholder 2">
+            <a:extLst>
+              <a:ext uri="{FF2B5EF4-FFF2-40B4-BE49-F238E27FC236}">
+                <a16:creationId xmlns:a16="http://schemas.microsoft.com/office/drawing/2014/main" id="{145FAC0A-9F40-C942-9675-DED9A8D58FF7}"/>
+              </a:ext>
+            </a:extLst>
+          </p:cNvPr>
+          <p:cNvSpPr>
+            <a:spLocks noGrp="1"/>
+          </p:cNvSpPr>
+          <p:nvPr>
+            <p:ph idx="1"/>
+          </p:nvPr>
+        </p:nvSpPr>
+        <p:spPr/>
+        <p:txBody>
+          <a:bodyPr/>
+          <a:lstStyle/>
+          <a:p>
+            <a:endParaRPr lang="en-US"/>
+          </a:p>
+        </p:txBody>
+      </p:sp>
+    </p:spTree>
+    <p:extLst>
+      <p:ext uri="{BB962C8B-B14F-4D97-AF65-F5344CB8AC3E}">
+        <p14:creationId xmlns:p14="http://schemas.microsoft.com/office/powerpoint/2010/main" val="1764273956"/>
+      </p:ext>
+    </p:extLst>
+  </p:cSld>
+  <p:clrMapOvr>
+    <a:masterClrMapping/>
+  </p:clrMapOvr>
+</p:sld>
+</file>
+
+<file path=ppt/slides/slide12.xml><?xml version="1.0" encoding="utf-8"?>
+<p:sld xmlns:a="http://schemas.openxmlformats.org/drawingml/2006/main" xmlns:r="http://schemas.openxmlformats.org/officeDocument/2006/relationships" xmlns:p="http://schemas.openxmlformats.org/presentationml/2006/main">
+  <p:cSld>
+    <p:spTree>
+      <p:nvGrpSpPr>
+        <p:cNvPr id="1" name=""/>
+        <p:cNvGrpSpPr/>
+        <p:nvPr/>
+      </p:nvGrpSpPr>
+      <p:grpSpPr>
+        <a:xfrm>
+          <a:off x="0" y="0"/>
+          <a:ext cx="0" cy="0"/>
+          <a:chOff x="0" y="0"/>
+          <a:chExt cx="0" cy="0"/>
+        </a:xfrm>
+      </p:grpSpPr>
+      <p:sp>
+        <p:nvSpPr>
+          <p:cNvPr id="2" name="Title 1">
+            <a:extLst>
+              <a:ext uri="{FF2B5EF4-FFF2-40B4-BE49-F238E27FC236}">
+                <a16:creationId xmlns:a16="http://schemas.microsoft.com/office/drawing/2014/main" id="{0CAD8607-3D0E-F34C-A71C-E1FCD84847DA}"/>
+              </a:ext>
+            </a:extLst>
+          </p:cNvPr>
+          <p:cNvSpPr>
+            <a:spLocks noGrp="1"/>
+          </p:cNvSpPr>
+          <p:nvPr>
+            <p:ph type="title"/>
+          </p:nvPr>
+        </p:nvSpPr>
+        <p:spPr/>
+        <p:txBody>
+          <a:bodyPr/>
+          <a:lstStyle/>
+          <a:p>
+            <a:endParaRPr lang="en-US"/>
+          </a:p>
+        </p:txBody>
+      </p:sp>
+      <p:sp>
+        <p:nvSpPr>
+          <p:cNvPr id="3" name="Content Placeholder 2">
+            <a:extLst>
+              <a:ext uri="{FF2B5EF4-FFF2-40B4-BE49-F238E27FC236}">
+                <a16:creationId xmlns:a16="http://schemas.microsoft.com/office/drawing/2014/main" id="{3C783A4D-ADD3-FE47-A802-7E1E33980728}"/>
+              </a:ext>
+            </a:extLst>
+          </p:cNvPr>
+          <p:cNvSpPr>
+            <a:spLocks noGrp="1"/>
+          </p:cNvSpPr>
+          <p:nvPr>
+            <p:ph idx="1"/>
+          </p:nvPr>
+        </p:nvSpPr>
+        <p:spPr/>
+        <p:txBody>
+          <a:bodyPr/>
+          <a:lstStyle/>
+          <a:p>
+            <a:endParaRPr lang="en-US"/>
+          </a:p>
+        </p:txBody>
+      </p:sp>
+    </p:spTree>
+    <p:extLst>
+      <p:ext uri="{BB962C8B-B14F-4D97-AF65-F5344CB8AC3E}">
+        <p14:creationId xmlns:p14="http://schemas.microsoft.com/office/powerpoint/2010/main" val="1482911797"/>
+      </p:ext>
+    </p:extLst>
+  </p:cSld>
+  <p:clrMapOvr>
+    <a:masterClrMapping/>
+  </p:clrMapOvr>
+</p:sld>
+</file>
+
+<file path=ppt/slides/slide13.xml><?xml version="1.0" encoding="utf-8"?>
+<p:sld xmlns:a="http://schemas.openxmlformats.org/drawingml/2006/main" xmlns:r="http://schemas.openxmlformats.org/officeDocument/2006/relationships" xmlns:p="http://schemas.openxmlformats.org/presentationml/2006/main">
+  <p:cSld>
+    <p:spTree>
+      <p:nvGrpSpPr>
+        <p:cNvPr id="1" name=""/>
+        <p:cNvGrpSpPr/>
+        <p:nvPr/>
+      </p:nvGrpSpPr>
+      <p:grpSpPr>
+        <a:xfrm>
+          <a:off x="0" y="0"/>
+          <a:ext cx="0" cy="0"/>
+          <a:chOff x="0" y="0"/>
+          <a:chExt cx="0" cy="0"/>
+        </a:xfrm>
+      </p:grpSpPr>
+      <p:sp>
+        <p:nvSpPr>
+          <p:cNvPr id="2" name="Title 1">
+            <a:extLst>
+              <a:ext uri="{FF2B5EF4-FFF2-40B4-BE49-F238E27FC236}">
+                <a16:creationId xmlns:a16="http://schemas.microsoft.com/office/drawing/2014/main" id="{EF948449-51E6-9148-82F6-455F26533FA8}"/>
+              </a:ext>
+            </a:extLst>
+          </p:cNvPr>
+          <p:cNvSpPr>
+            <a:spLocks noGrp="1"/>
+          </p:cNvSpPr>
+          <p:nvPr>
+            <p:ph type="title"/>
+          </p:nvPr>
+        </p:nvSpPr>
+        <p:spPr/>
+        <p:txBody>
+          <a:bodyPr/>
+          <a:lstStyle/>
+          <a:p>
+            <a:endParaRPr lang="en-US"/>
+          </a:p>
+        </p:txBody>
+      </p:sp>
+      <p:sp>
+        <p:nvSpPr>
+          <p:cNvPr id="3" name="Content Placeholder 2">
+            <a:extLst>
+              <a:ext uri="{FF2B5EF4-FFF2-40B4-BE49-F238E27FC236}">
+                <a16:creationId xmlns:a16="http://schemas.microsoft.com/office/drawing/2014/main" id="{813F127E-461D-714F-B0A3-A39A056EAE55}"/>
+              </a:ext>
+            </a:extLst>
+          </p:cNvPr>
+          <p:cNvSpPr>
+            <a:spLocks noGrp="1"/>
+          </p:cNvSpPr>
+          <p:nvPr>
+            <p:ph idx="1"/>
+          </p:nvPr>
+        </p:nvSpPr>
+        <p:spPr/>
+        <p:txBody>
+          <a:bodyPr/>
+          <a:lstStyle/>
+          <a:p>
+            <a:endParaRPr lang="en-US"/>
+          </a:p>
+        </p:txBody>
+      </p:sp>
+    </p:spTree>
+    <p:extLst>
+      <p:ext uri="{BB962C8B-B14F-4D97-AF65-F5344CB8AC3E}">
+        <p14:creationId xmlns:p14="http://schemas.microsoft.com/office/powerpoint/2010/main" val="3225130834"/>
+      </p:ext>
+    </p:extLst>
+  </p:cSld>
+  <p:clrMapOvr>
+    <a:masterClrMapping/>
+  </p:clrMapOvr>
+</p:sld>
+</file>
+
 <file path=ppt/slides/slide2.xml><?xml version="1.0" encoding="utf-8"?>
 <p:sld xmlns:a="http://schemas.openxmlformats.org/drawingml/2006/main" xmlns:r="http://schemas.openxmlformats.org/officeDocument/2006/relationships" xmlns:p="http://schemas.openxmlformats.org/presentationml/2006/main">
   <p:cSld>
@@ -4007,7 +4331,10 @@
           <a:bodyPr/>
           <a:lstStyle/>
           <a:p>
-            <a:endParaRPr lang="en-US"/>
+            <a:r>
+              <a:rPr lang="en-US" dirty="0"/>
+              <a:t>Spring Web Reactive</a:t>
+            </a:r>
           </a:p>
         </p:txBody>
       </p:sp>
@@ -4029,10 +4356,145 @@
         </p:nvSpPr>
         <p:spPr/>
         <p:txBody>
-          <a:bodyPr/>
-          <a:lstStyle/>
-          <a:p>
-            <a:endParaRPr lang="en-US"/>
+          <a:bodyPr>
+            <a:normAutofit fontScale="92500" lnSpcReduction="10000"/>
+          </a:bodyPr>
+          <a:lstStyle/>
+          <a:p>
+            <a:r>
+              <a:rPr lang="en-US" dirty="0"/>
+              <a:t>The mock implementations of </a:t>
+            </a:r>
+            <a:r>
+              <a:rPr lang="en-US" dirty="0" err="1">
+                <a:latin typeface="Courier" pitchFamily="2" charset="0"/>
+              </a:rPr>
+              <a:t>ServerHttpRequest</a:t>
+            </a:r>
+            <a:r>
+              <a:rPr lang="en-US" dirty="0"/>
+              <a:t> and </a:t>
+            </a:r>
+            <a:r>
+              <a:rPr lang="en-US" dirty="0" err="1">
+                <a:latin typeface="Courier" pitchFamily="2" charset="0"/>
+              </a:rPr>
+              <a:t>ServerHttpResponse</a:t>
+            </a:r>
+            <a:r>
+              <a:rPr lang="en-US" dirty="0"/>
+              <a:t> are provided for testing </a:t>
+            </a:r>
+            <a:r>
+              <a:rPr lang="en-US" dirty="0" err="1"/>
+              <a:t>WebFlux</a:t>
+            </a:r>
+            <a:r>
+              <a:rPr lang="en-US" dirty="0"/>
+              <a:t> applications are provided in the </a:t>
+            </a:r>
+            <a:r>
+              <a:rPr lang="en-US" dirty="0" err="1">
+                <a:latin typeface="Courier" pitchFamily="2" charset="0"/>
+              </a:rPr>
+              <a:t>org.springframework.mock.http.server.reactive</a:t>
+            </a:r>
+            <a:r>
+              <a:rPr lang="en-US" dirty="0">
+                <a:latin typeface="Courier" pitchFamily="2" charset="0"/>
+              </a:rPr>
+              <a:t> </a:t>
+            </a:r>
+            <a:r>
+              <a:rPr lang="en-US" dirty="0"/>
+              <a:t>package. </a:t>
+            </a:r>
+          </a:p>
+          <a:p>
+            <a:pPr lvl="1"/>
+            <a:r>
+              <a:rPr lang="en-US" dirty="0"/>
+              <a:t>The </a:t>
+            </a:r>
+            <a:r>
+              <a:rPr lang="en-US" dirty="0" err="1">
+                <a:latin typeface="Courier" pitchFamily="2" charset="0"/>
+              </a:rPr>
+              <a:t>org.springframework.mock.web.server</a:t>
+            </a:r>
+            <a:r>
+              <a:rPr lang="en-US" dirty="0">
+                <a:latin typeface="Courier" pitchFamily="2" charset="0"/>
+              </a:rPr>
+              <a:t> </a:t>
+            </a:r>
+            <a:r>
+              <a:rPr lang="en-US" dirty="0"/>
+              <a:t>package contains a mock </a:t>
+            </a:r>
+            <a:r>
+              <a:rPr lang="en-US" dirty="0" err="1">
+                <a:latin typeface="Courier" pitchFamily="2" charset="0"/>
+              </a:rPr>
+              <a:t>ServerWebExchange</a:t>
+            </a:r>
+            <a:r>
+              <a:rPr lang="en-US" dirty="0"/>
+              <a:t> that depends on those mock implementations.</a:t>
+            </a:r>
+          </a:p>
+          <a:p>
+            <a:r>
+              <a:rPr lang="en-US" dirty="0"/>
+              <a:t>Both </a:t>
+            </a:r>
+            <a:r>
+              <a:rPr lang="en-US" dirty="0" err="1">
+                <a:latin typeface="Courier" pitchFamily="2" charset="0"/>
+              </a:rPr>
+              <a:t>MockServerHttpRequest</a:t>
+            </a:r>
+            <a:r>
+              <a:rPr lang="en-US" dirty="0"/>
+              <a:t> and </a:t>
+            </a:r>
+            <a:r>
+              <a:rPr lang="en-US" dirty="0" err="1">
+                <a:latin typeface="Courier" pitchFamily="2" charset="0"/>
+              </a:rPr>
+              <a:t>MockServerHttpResponse</a:t>
+            </a:r>
+            <a:r>
+              <a:rPr lang="en-US" dirty="0"/>
+              <a:t> extend from the same abstract base classes as server-specific implementations and share behavior with them. </a:t>
+            </a:r>
+          </a:p>
+          <a:p>
+            <a:pPr lvl="1"/>
+            <a:r>
+              <a:rPr lang="en-US" dirty="0"/>
+              <a:t>For example, a mock request is immutable once created, but you can use the </a:t>
+            </a:r>
+            <a:r>
+              <a:rPr lang="en-US" dirty="0">
+                <a:latin typeface="Courier" pitchFamily="2" charset="0"/>
+              </a:rPr>
+              <a:t>mutate()</a:t>
+            </a:r>
+            <a:r>
+              <a:rPr lang="en-US" dirty="0"/>
+              <a:t> method from </a:t>
+            </a:r>
+            <a:r>
+              <a:rPr lang="en-US" dirty="0" err="1">
+                <a:latin typeface="Courier" pitchFamily="2" charset="0"/>
+              </a:rPr>
+              <a:t>ServerHttpRequest</a:t>
+            </a:r>
+            <a:r>
+              <a:rPr lang="en-US" dirty="0"/>
+              <a:t> to create a modified instance.</a:t>
+            </a:r>
           </a:p>
         </p:txBody>
       </p:sp>
@@ -4087,7 +4549,10 @@
           <a:bodyPr/>
           <a:lstStyle/>
           <a:p>
-            <a:endParaRPr lang="en-US"/>
+            <a:r>
+              <a:rPr lang="en-US" dirty="0"/>
+              <a:t>Spring Web Reactive</a:t>
+            </a:r>
           </a:p>
         </p:txBody>
       </p:sp>
@@ -4112,7 +4577,62 @@
           <a:bodyPr/>
           <a:lstStyle/>
           <a:p>
-            <a:endParaRPr lang="en-US"/>
+            <a:r>
+              <a:rPr lang="en-US" dirty="0"/>
+              <a:t>In order for the mock response to properly implement the write contract and return a write completion handle (that is, Mono&lt;Void&gt;), it by default uses a Flux with cache().then(), which buffers the data and makes it available for assertions in tests</a:t>
+            </a:r>
+            <a:r>
+              <a:rPr lang="en-US"/>
+              <a:t>. </a:t>
+            </a:r>
+          </a:p>
+          <a:p>
+            <a:pPr lvl="1"/>
+            <a:r>
+              <a:rPr lang="en-US"/>
+              <a:t>Applications </a:t>
+            </a:r>
+            <a:r>
+              <a:rPr lang="en-US" dirty="0"/>
+              <a:t>can set a custom write function (for example, to test an infinite stream).</a:t>
+            </a:r>
+          </a:p>
+          <a:p>
+            <a:r>
+              <a:rPr lang="en-US" dirty="0"/>
+              <a:t>The </a:t>
+            </a:r>
+            <a:r>
+              <a:rPr lang="en-US" dirty="0" err="1">
+                <a:latin typeface="Courier" pitchFamily="2" charset="0"/>
+              </a:rPr>
+              <a:t>WebTestClient</a:t>
+            </a:r>
+            <a:r>
+              <a:rPr lang="en-US" dirty="0"/>
+              <a:t> builds on the mock request and response to provide support for testing </a:t>
+            </a:r>
+            <a:r>
+              <a:rPr lang="en-US" dirty="0" err="1"/>
+              <a:t>WebFlux</a:t>
+            </a:r>
+            <a:r>
+              <a:rPr lang="en-US" dirty="0"/>
+              <a:t> applications without an HTTP server. </a:t>
+            </a:r>
+          </a:p>
+          <a:p>
+            <a:pPr lvl="1"/>
+            <a:r>
+              <a:rPr lang="en-US" dirty="0"/>
+              <a:t>The client can also be used for end-to-end tests with a running server.</a:t>
+            </a:r>
+          </a:p>
+          <a:p>
+            <a:endParaRPr lang="en-US" dirty="0"/>
+          </a:p>
+          <a:p>
+            <a:endParaRPr lang="en-US" dirty="0"/>
           </a:p>
         </p:txBody>
       </p:sp>
@@ -4151,7 +4671,7 @@
           <p:cNvPr id="2" name="Title 1">
             <a:extLst>
               <a:ext uri="{FF2B5EF4-FFF2-40B4-BE49-F238E27FC236}">
-                <a16:creationId xmlns:a16="http://schemas.microsoft.com/office/drawing/2014/main" id="{0CAD8607-3D0E-F34C-A71C-E1FCD84847DA}"/>
+                <a16:creationId xmlns:a16="http://schemas.microsoft.com/office/drawing/2014/main" id="{0721C84B-4C4A-C94C-8F18-7F1C16D2A1F4}"/>
               </a:ext>
             </a:extLst>
           </p:cNvPr>
@@ -4176,7 +4696,7 @@
           <p:cNvPr id="3" name="Content Placeholder 2">
             <a:extLst>
               <a:ext uri="{FF2B5EF4-FFF2-40B4-BE49-F238E27FC236}">
-                <a16:creationId xmlns:a16="http://schemas.microsoft.com/office/drawing/2014/main" id="{3C783A4D-ADD3-FE47-A802-7E1E33980728}"/>
+                <a16:creationId xmlns:a16="http://schemas.microsoft.com/office/drawing/2014/main" id="{145FAC0A-9F40-C942-9675-DED9A8D58FF7}"/>
               </a:ext>
             </a:extLst>
           </p:cNvPr>
@@ -4199,7 +4719,7 @@
     </p:spTree>
     <p:extLst>
       <p:ext uri="{BB962C8B-B14F-4D97-AF65-F5344CB8AC3E}">
-        <p14:creationId xmlns:p14="http://schemas.microsoft.com/office/powerpoint/2010/main" val="1482911797"/>
+        <p14:creationId xmlns:p14="http://schemas.microsoft.com/office/powerpoint/2010/main" val="13085774"/>
       </p:ext>
     </p:extLst>
   </p:cSld>
@@ -4231,7 +4751,7 @@
           <p:cNvPr id="2" name="Title 1">
             <a:extLst>
               <a:ext uri="{FF2B5EF4-FFF2-40B4-BE49-F238E27FC236}">
-                <a16:creationId xmlns:a16="http://schemas.microsoft.com/office/drawing/2014/main" id="{EF948449-51E6-9148-82F6-455F26533FA8}"/>
+                <a16:creationId xmlns:a16="http://schemas.microsoft.com/office/drawing/2014/main" id="{0721C84B-4C4A-C94C-8F18-7F1C16D2A1F4}"/>
               </a:ext>
             </a:extLst>
           </p:cNvPr>
@@ -4256,7 +4776,7 @@
           <p:cNvPr id="3" name="Content Placeholder 2">
             <a:extLst>
               <a:ext uri="{FF2B5EF4-FFF2-40B4-BE49-F238E27FC236}">
-                <a16:creationId xmlns:a16="http://schemas.microsoft.com/office/drawing/2014/main" id="{813F127E-461D-714F-B0A3-A39A056EAE55}"/>
+                <a16:creationId xmlns:a16="http://schemas.microsoft.com/office/drawing/2014/main" id="{145FAC0A-9F40-C942-9675-DED9A8D58FF7}"/>
               </a:ext>
             </a:extLst>
           </p:cNvPr>
@@ -4279,7 +4799,7 @@
     </p:spTree>
     <p:extLst>
       <p:ext uri="{BB962C8B-B14F-4D97-AF65-F5344CB8AC3E}">
-        <p14:creationId xmlns:p14="http://schemas.microsoft.com/office/powerpoint/2010/main" val="3225130834"/>
+        <p14:creationId xmlns:p14="http://schemas.microsoft.com/office/powerpoint/2010/main" val="1337207298"/>
       </p:ext>
     </p:extLst>
   </p:cSld>

</xml_diff>

<commit_message>
Updates to Spring Framework testing support presentation
</commit_message>
<xml_diff>
--- a/presentations/Introduction to Spring Framework Testing.pptx
+++ b/presentations/Introduction to Spring Framework Testing.pptx
@@ -6,18 +6,20 @@
   </p:sldMasterIdLst>
   <p:sldIdLst>
     <p:sldId id="256" r:id="rId2"/>
-    <p:sldId id="257" r:id="rId3"/>
-    <p:sldId id="258" r:id="rId4"/>
-    <p:sldId id="259" r:id="rId5"/>
-    <p:sldId id="260" r:id="rId6"/>
-    <p:sldId id="261" r:id="rId7"/>
-    <p:sldId id="262" r:id="rId8"/>
-    <p:sldId id="265" r:id="rId9"/>
-    <p:sldId id="266" r:id="rId10"/>
-    <p:sldId id="267" r:id="rId11"/>
-    <p:sldId id="268" r:id="rId12"/>
-    <p:sldId id="263" r:id="rId13"/>
-    <p:sldId id="264" r:id="rId14"/>
+    <p:sldId id="265" r:id="rId3"/>
+    <p:sldId id="269" r:id="rId4"/>
+    <p:sldId id="257" r:id="rId5"/>
+    <p:sldId id="258" r:id="rId6"/>
+    <p:sldId id="259" r:id="rId7"/>
+    <p:sldId id="260" r:id="rId8"/>
+    <p:sldId id="270" r:id="rId9"/>
+    <p:sldId id="261" r:id="rId10"/>
+    <p:sldId id="262" r:id="rId11"/>
+    <p:sldId id="266" r:id="rId12"/>
+    <p:sldId id="267" r:id="rId13"/>
+    <p:sldId id="268" r:id="rId14"/>
+    <p:sldId id="263" r:id="rId15"/>
+    <p:sldId id="264" r:id="rId16"/>
   </p:sldIdLst>
   <p:sldSz cx="12192000" cy="6858000"/>
   <p:notesSz cx="6858000" cy="9144000"/>
@@ -271,7 +273,7 @@
           <a:p>
             <a:fld id="{B38EF465-D677-F140-82CD-891C0463380E}" type="datetimeFigureOut">
               <a:rPr lang="en-US" smtClean="0"/>
-              <a:t>10/26/21</a:t>
+              <a:t>10/31/21</a:t>
             </a:fld>
             <a:endParaRPr lang="en-US"/>
           </a:p>
@@ -469,7 +471,7 @@
           <a:p>
             <a:fld id="{B38EF465-D677-F140-82CD-891C0463380E}" type="datetimeFigureOut">
               <a:rPr lang="en-US" smtClean="0"/>
-              <a:t>10/26/21</a:t>
+              <a:t>10/31/21</a:t>
             </a:fld>
             <a:endParaRPr lang="en-US"/>
           </a:p>
@@ -677,7 +679,7 @@
           <a:p>
             <a:fld id="{B38EF465-D677-F140-82CD-891C0463380E}" type="datetimeFigureOut">
               <a:rPr lang="en-US" smtClean="0"/>
-              <a:t>10/26/21</a:t>
+              <a:t>10/31/21</a:t>
             </a:fld>
             <a:endParaRPr lang="en-US"/>
           </a:p>
@@ -875,7 +877,7 @@
           <a:p>
             <a:fld id="{B38EF465-D677-F140-82CD-891C0463380E}" type="datetimeFigureOut">
               <a:rPr lang="en-US" smtClean="0"/>
-              <a:t>10/26/21</a:t>
+              <a:t>10/31/21</a:t>
             </a:fld>
             <a:endParaRPr lang="en-US"/>
           </a:p>
@@ -1150,7 +1152,7 @@
           <a:p>
             <a:fld id="{B38EF465-D677-F140-82CD-891C0463380E}" type="datetimeFigureOut">
               <a:rPr lang="en-US" smtClean="0"/>
-              <a:t>10/26/21</a:t>
+              <a:t>10/31/21</a:t>
             </a:fld>
             <a:endParaRPr lang="en-US"/>
           </a:p>
@@ -1415,7 +1417,7 @@
           <a:p>
             <a:fld id="{B38EF465-D677-F140-82CD-891C0463380E}" type="datetimeFigureOut">
               <a:rPr lang="en-US" smtClean="0"/>
-              <a:t>10/26/21</a:t>
+              <a:t>10/31/21</a:t>
             </a:fld>
             <a:endParaRPr lang="en-US"/>
           </a:p>
@@ -1827,7 +1829,7 @@
           <a:p>
             <a:fld id="{B38EF465-D677-F140-82CD-891C0463380E}" type="datetimeFigureOut">
               <a:rPr lang="en-US" smtClean="0"/>
-              <a:t>10/26/21</a:t>
+              <a:t>10/31/21</a:t>
             </a:fld>
             <a:endParaRPr lang="en-US"/>
           </a:p>
@@ -1968,7 +1970,7 @@
           <a:p>
             <a:fld id="{B38EF465-D677-F140-82CD-891C0463380E}" type="datetimeFigureOut">
               <a:rPr lang="en-US" smtClean="0"/>
-              <a:t>10/26/21</a:t>
+              <a:t>10/31/21</a:t>
             </a:fld>
             <a:endParaRPr lang="en-US"/>
           </a:p>
@@ -2081,7 +2083,7 @@
           <a:p>
             <a:fld id="{B38EF465-D677-F140-82CD-891C0463380E}" type="datetimeFigureOut">
               <a:rPr lang="en-US" smtClean="0"/>
-              <a:t>10/26/21</a:t>
+              <a:t>10/31/21</a:t>
             </a:fld>
             <a:endParaRPr lang="en-US"/>
           </a:p>
@@ -2392,7 +2394,7 @@
           <a:p>
             <a:fld id="{B38EF465-D677-F140-82CD-891C0463380E}" type="datetimeFigureOut">
               <a:rPr lang="en-US" smtClean="0"/>
-              <a:t>10/26/21</a:t>
+              <a:t>10/31/21</a:t>
             </a:fld>
             <a:endParaRPr lang="en-US"/>
           </a:p>
@@ -2680,7 +2682,7 @@
           <a:p>
             <a:fld id="{B38EF465-D677-F140-82CD-891C0463380E}" type="datetimeFigureOut">
               <a:rPr lang="en-US" smtClean="0"/>
-              <a:t>10/26/21</a:t>
+              <a:t>10/31/21</a:t>
             </a:fld>
             <a:endParaRPr lang="en-US"/>
           </a:p>
@@ -2921,7 +2923,7 @@
           <a:p>
             <a:fld id="{B38EF465-D677-F140-82CD-891C0463380E}" type="datetimeFigureOut">
               <a:rPr lang="en-US" smtClean="0"/>
-              <a:t>10/26/21</a:t>
+              <a:t>10/31/21</a:t>
             </a:fld>
             <a:endParaRPr lang="en-US"/>
           </a:p>
@@ -3445,7 +3447,10 @@
           <a:bodyPr/>
           <a:lstStyle/>
           <a:p>
-            <a:endParaRPr lang="en-US"/>
+            <a:r>
+              <a:rPr lang="en-US" dirty="0"/>
+              <a:t>Spring Web Reactive</a:t>
+            </a:r>
           </a:p>
         </p:txBody>
       </p:sp>
@@ -3470,14 +3475,69 @@
           <a:bodyPr/>
           <a:lstStyle/>
           <a:p>
-            <a:endParaRPr lang="en-US"/>
+            <a:r>
+              <a:rPr lang="en-US" dirty="0"/>
+              <a:t>In order for the mock response to properly implement the write contract and return a write completion handle (that is, Mono&lt;Void&gt;), it by default uses a Flux with cache().then(), which buffers the data and makes it available for assertions in tests</a:t>
+            </a:r>
+            <a:r>
+              <a:rPr lang="en-US"/>
+              <a:t>. </a:t>
+            </a:r>
+          </a:p>
+          <a:p>
+            <a:pPr lvl="1"/>
+            <a:r>
+              <a:rPr lang="en-US"/>
+              <a:t>Applications </a:t>
+            </a:r>
+            <a:r>
+              <a:rPr lang="en-US" dirty="0"/>
+              <a:t>can set a custom write function (for example, to test an infinite stream).</a:t>
+            </a:r>
+          </a:p>
+          <a:p>
+            <a:r>
+              <a:rPr lang="en-US" dirty="0"/>
+              <a:t>The </a:t>
+            </a:r>
+            <a:r>
+              <a:rPr lang="en-US" dirty="0" err="1">
+                <a:latin typeface="Courier" pitchFamily="2" charset="0"/>
+              </a:rPr>
+              <a:t>WebTestClient</a:t>
+            </a:r>
+            <a:r>
+              <a:rPr lang="en-US" dirty="0"/>
+              <a:t> builds on the mock request and response to provide support for testing </a:t>
+            </a:r>
+            <a:r>
+              <a:rPr lang="en-US" dirty="0" err="1"/>
+              <a:t>WebFlux</a:t>
+            </a:r>
+            <a:r>
+              <a:rPr lang="en-US" dirty="0"/>
+              <a:t> applications without an HTTP server. </a:t>
+            </a:r>
+          </a:p>
+          <a:p>
+            <a:pPr lvl="1"/>
+            <a:r>
+              <a:rPr lang="en-US" dirty="0"/>
+              <a:t>The client can also be used for end-to-end tests with a running server.</a:t>
+            </a:r>
+          </a:p>
+          <a:p>
+            <a:endParaRPr lang="en-US" dirty="0"/>
+          </a:p>
+          <a:p>
+            <a:endParaRPr lang="en-US" dirty="0"/>
           </a:p>
         </p:txBody>
       </p:sp>
     </p:spTree>
     <p:extLst>
       <p:ext uri="{BB962C8B-B14F-4D97-AF65-F5344CB8AC3E}">
-        <p14:creationId xmlns:p14="http://schemas.microsoft.com/office/powerpoint/2010/main" val="82220067"/>
+        <p14:creationId xmlns:p14="http://schemas.microsoft.com/office/powerpoint/2010/main" val="3851587936"/>
       </p:ext>
     </p:extLst>
   </p:cSld>
@@ -3557,7 +3617,7 @@
     </p:spTree>
     <p:extLst>
       <p:ext uri="{BB962C8B-B14F-4D97-AF65-F5344CB8AC3E}">
-        <p14:creationId xmlns:p14="http://schemas.microsoft.com/office/powerpoint/2010/main" val="1764273956"/>
+        <p14:creationId xmlns:p14="http://schemas.microsoft.com/office/powerpoint/2010/main" val="1337207298"/>
       </p:ext>
     </p:extLst>
   </p:cSld>
@@ -3589,7 +3649,7 @@
           <p:cNvPr id="2" name="Title 1">
             <a:extLst>
               <a:ext uri="{FF2B5EF4-FFF2-40B4-BE49-F238E27FC236}">
-                <a16:creationId xmlns:a16="http://schemas.microsoft.com/office/drawing/2014/main" id="{0CAD8607-3D0E-F34C-A71C-E1FCD84847DA}"/>
+                <a16:creationId xmlns:a16="http://schemas.microsoft.com/office/drawing/2014/main" id="{0721C84B-4C4A-C94C-8F18-7F1C16D2A1F4}"/>
               </a:ext>
             </a:extLst>
           </p:cNvPr>
@@ -3614,7 +3674,7 @@
           <p:cNvPr id="3" name="Content Placeholder 2">
             <a:extLst>
               <a:ext uri="{FF2B5EF4-FFF2-40B4-BE49-F238E27FC236}">
-                <a16:creationId xmlns:a16="http://schemas.microsoft.com/office/drawing/2014/main" id="{3C783A4D-ADD3-FE47-A802-7E1E33980728}"/>
+                <a16:creationId xmlns:a16="http://schemas.microsoft.com/office/drawing/2014/main" id="{145FAC0A-9F40-C942-9675-DED9A8D58FF7}"/>
               </a:ext>
             </a:extLst>
           </p:cNvPr>
@@ -3637,7 +3697,7 @@
     </p:spTree>
     <p:extLst>
       <p:ext uri="{BB962C8B-B14F-4D97-AF65-F5344CB8AC3E}">
-        <p14:creationId xmlns:p14="http://schemas.microsoft.com/office/powerpoint/2010/main" val="1482911797"/>
+        <p14:creationId xmlns:p14="http://schemas.microsoft.com/office/powerpoint/2010/main" val="82220067"/>
       </p:ext>
     </p:extLst>
   </p:cSld>
@@ -3669,6 +3729,166 @@
           <p:cNvPr id="2" name="Title 1">
             <a:extLst>
               <a:ext uri="{FF2B5EF4-FFF2-40B4-BE49-F238E27FC236}">
+                <a16:creationId xmlns:a16="http://schemas.microsoft.com/office/drawing/2014/main" id="{0721C84B-4C4A-C94C-8F18-7F1C16D2A1F4}"/>
+              </a:ext>
+            </a:extLst>
+          </p:cNvPr>
+          <p:cNvSpPr>
+            <a:spLocks noGrp="1"/>
+          </p:cNvSpPr>
+          <p:nvPr>
+            <p:ph type="title"/>
+          </p:nvPr>
+        </p:nvSpPr>
+        <p:spPr/>
+        <p:txBody>
+          <a:bodyPr/>
+          <a:lstStyle/>
+          <a:p>
+            <a:endParaRPr lang="en-US"/>
+          </a:p>
+        </p:txBody>
+      </p:sp>
+      <p:sp>
+        <p:nvSpPr>
+          <p:cNvPr id="3" name="Content Placeholder 2">
+            <a:extLst>
+              <a:ext uri="{FF2B5EF4-FFF2-40B4-BE49-F238E27FC236}">
+                <a16:creationId xmlns:a16="http://schemas.microsoft.com/office/drawing/2014/main" id="{145FAC0A-9F40-C942-9675-DED9A8D58FF7}"/>
+              </a:ext>
+            </a:extLst>
+          </p:cNvPr>
+          <p:cNvSpPr>
+            <a:spLocks noGrp="1"/>
+          </p:cNvSpPr>
+          <p:nvPr>
+            <p:ph idx="1"/>
+          </p:nvPr>
+        </p:nvSpPr>
+        <p:spPr/>
+        <p:txBody>
+          <a:bodyPr/>
+          <a:lstStyle/>
+          <a:p>
+            <a:endParaRPr lang="en-US"/>
+          </a:p>
+        </p:txBody>
+      </p:sp>
+    </p:spTree>
+    <p:extLst>
+      <p:ext uri="{BB962C8B-B14F-4D97-AF65-F5344CB8AC3E}">
+        <p14:creationId xmlns:p14="http://schemas.microsoft.com/office/powerpoint/2010/main" val="1764273956"/>
+      </p:ext>
+    </p:extLst>
+  </p:cSld>
+  <p:clrMapOvr>
+    <a:masterClrMapping/>
+  </p:clrMapOvr>
+</p:sld>
+</file>
+
+<file path=ppt/slides/slide14.xml><?xml version="1.0" encoding="utf-8"?>
+<p:sld xmlns:a="http://schemas.openxmlformats.org/drawingml/2006/main" xmlns:r="http://schemas.openxmlformats.org/officeDocument/2006/relationships" xmlns:p="http://schemas.openxmlformats.org/presentationml/2006/main">
+  <p:cSld>
+    <p:spTree>
+      <p:nvGrpSpPr>
+        <p:cNvPr id="1" name=""/>
+        <p:cNvGrpSpPr/>
+        <p:nvPr/>
+      </p:nvGrpSpPr>
+      <p:grpSpPr>
+        <a:xfrm>
+          <a:off x="0" y="0"/>
+          <a:ext cx="0" cy="0"/>
+          <a:chOff x="0" y="0"/>
+          <a:chExt cx="0" cy="0"/>
+        </a:xfrm>
+      </p:grpSpPr>
+      <p:sp>
+        <p:nvSpPr>
+          <p:cNvPr id="2" name="Title 1">
+            <a:extLst>
+              <a:ext uri="{FF2B5EF4-FFF2-40B4-BE49-F238E27FC236}">
+                <a16:creationId xmlns:a16="http://schemas.microsoft.com/office/drawing/2014/main" id="{0CAD8607-3D0E-F34C-A71C-E1FCD84847DA}"/>
+              </a:ext>
+            </a:extLst>
+          </p:cNvPr>
+          <p:cNvSpPr>
+            <a:spLocks noGrp="1"/>
+          </p:cNvSpPr>
+          <p:nvPr>
+            <p:ph type="title"/>
+          </p:nvPr>
+        </p:nvSpPr>
+        <p:spPr/>
+        <p:txBody>
+          <a:bodyPr/>
+          <a:lstStyle/>
+          <a:p>
+            <a:endParaRPr lang="en-US"/>
+          </a:p>
+        </p:txBody>
+      </p:sp>
+      <p:sp>
+        <p:nvSpPr>
+          <p:cNvPr id="3" name="Content Placeholder 2">
+            <a:extLst>
+              <a:ext uri="{FF2B5EF4-FFF2-40B4-BE49-F238E27FC236}">
+                <a16:creationId xmlns:a16="http://schemas.microsoft.com/office/drawing/2014/main" id="{3C783A4D-ADD3-FE47-A802-7E1E33980728}"/>
+              </a:ext>
+            </a:extLst>
+          </p:cNvPr>
+          <p:cNvSpPr>
+            <a:spLocks noGrp="1"/>
+          </p:cNvSpPr>
+          <p:nvPr>
+            <p:ph idx="1"/>
+          </p:nvPr>
+        </p:nvSpPr>
+        <p:spPr/>
+        <p:txBody>
+          <a:bodyPr/>
+          <a:lstStyle/>
+          <a:p>
+            <a:endParaRPr lang="en-US"/>
+          </a:p>
+        </p:txBody>
+      </p:sp>
+    </p:spTree>
+    <p:extLst>
+      <p:ext uri="{BB962C8B-B14F-4D97-AF65-F5344CB8AC3E}">
+        <p14:creationId xmlns:p14="http://schemas.microsoft.com/office/powerpoint/2010/main" val="1482911797"/>
+      </p:ext>
+    </p:extLst>
+  </p:cSld>
+  <p:clrMapOvr>
+    <a:masterClrMapping/>
+  </p:clrMapOvr>
+</p:sld>
+</file>
+
+<file path=ppt/slides/slide15.xml><?xml version="1.0" encoding="utf-8"?>
+<p:sld xmlns:a="http://schemas.openxmlformats.org/drawingml/2006/main" xmlns:r="http://schemas.openxmlformats.org/officeDocument/2006/relationships" xmlns:p="http://schemas.openxmlformats.org/presentationml/2006/main">
+  <p:cSld>
+    <p:spTree>
+      <p:nvGrpSpPr>
+        <p:cNvPr id="1" name=""/>
+        <p:cNvGrpSpPr/>
+        <p:nvPr/>
+      </p:nvGrpSpPr>
+      <p:grpSpPr>
+        <a:xfrm>
+          <a:off x="0" y="0"/>
+          <a:ext cx="0" cy="0"/>
+          <a:chOff x="0" y="0"/>
+          <a:chExt cx="0" cy="0"/>
+        </a:xfrm>
+      </p:grpSpPr>
+      <p:sp>
+        <p:nvSpPr>
+          <p:cNvPr id="2" name="Title 1">
+            <a:extLst>
+              <a:ext uri="{FF2B5EF4-FFF2-40B4-BE49-F238E27FC236}">
                 <a16:creationId xmlns:a16="http://schemas.microsoft.com/office/drawing/2014/main" id="{EF948449-51E6-9148-82F6-455F26533FA8}"/>
               </a:ext>
             </a:extLst>
@@ -3685,7 +3905,10 @@
           <a:bodyPr/>
           <a:lstStyle/>
           <a:p>
-            <a:endParaRPr lang="en-US"/>
+            <a:r>
+              <a:rPr lang="en-US" dirty="0"/>
+              <a:t>References</a:t>
+            </a:r>
           </a:p>
         </p:txBody>
       </p:sp>
@@ -3710,7 +3933,16 @@
           <a:bodyPr/>
           <a:lstStyle/>
           <a:p>
-            <a:endParaRPr lang="en-US"/>
+            <a:r>
+              <a:rPr lang="en-US" dirty="0">
+                <a:hlinkClick r:id="rId2"/>
+              </a:rPr>
+              <a:t>https://docs.spring.io/spring-framework/docs/current/reference/html/testing.html</a:t>
+            </a:r>
+            <a:endParaRPr lang="en-US" dirty="0"/>
+          </a:p>
+          <a:p>
+            <a:endParaRPr lang="en-US" dirty="0"/>
           </a:p>
         </p:txBody>
       </p:sp>
@@ -3749,7 +3981,7 @@
           <p:cNvPr id="2" name="Title 1">
             <a:extLst>
               <a:ext uri="{FF2B5EF4-FFF2-40B4-BE49-F238E27FC236}">
-                <a16:creationId xmlns:a16="http://schemas.microsoft.com/office/drawing/2014/main" id="{BE059C70-14DB-9048-BAEE-8FCD59575F8F}"/>
+                <a16:creationId xmlns:a16="http://schemas.microsoft.com/office/drawing/2014/main" id="{0721C84B-4C4A-C94C-8F18-7F1C16D2A1F4}"/>
               </a:ext>
             </a:extLst>
           </p:cNvPr>
@@ -3766,9 +3998,10 @@
           <a:lstStyle/>
           <a:p>
             <a:r>
-              <a:rPr lang="en-US" dirty="0"/>
-              <a:t>Mock Environment support</a:t>
-            </a:r>
+              <a:rPr lang="en-US" dirty="0" err="1"/>
+              <a:t>ReflectionTestUtils</a:t>
+            </a:r>
+            <a:endParaRPr lang="en-US" dirty="0"/>
           </a:p>
         </p:txBody>
       </p:sp>
@@ -3777,7 +4010,7 @@
           <p:cNvPr id="3" name="Content Placeholder 2">
             <a:extLst>
               <a:ext uri="{FF2B5EF4-FFF2-40B4-BE49-F238E27FC236}">
-                <a16:creationId xmlns:a16="http://schemas.microsoft.com/office/drawing/2014/main" id="{528D3533-DB35-7C4B-A917-E784845190A3}"/>
+                <a16:creationId xmlns:a16="http://schemas.microsoft.com/office/drawing/2014/main" id="{145FAC0A-9F40-C942-9675-DED9A8D58FF7}"/>
               </a:ext>
             </a:extLst>
           </p:cNvPr>
@@ -3790,79 +4023,68 @@
         </p:nvSpPr>
         <p:spPr/>
         <p:txBody>
-          <a:bodyPr/>
-          <a:lstStyle/>
-          <a:p>
-            <a:r>
-              <a:rPr lang="en-US" dirty="0"/>
-              <a:t>The </a:t>
-            </a:r>
+          <a:bodyPr>
+            <a:normAutofit/>
+          </a:bodyPr>
+          <a:lstStyle/>
+          <a:p>
             <a:r>
               <a:rPr lang="en-US" dirty="0" err="1">
                 <a:latin typeface="Courier" pitchFamily="2" charset="0"/>
               </a:rPr>
-              <a:t>org.springframework.mock.env</a:t>
-            </a:r>
-            <a:r>
-              <a:rPr lang="en-US" dirty="0">
-                <a:latin typeface="Courier" pitchFamily="2" charset="0"/>
-              </a:rPr>
-              <a:t> </a:t>
-            </a:r>
-            <a:r>
-              <a:rPr lang="en-US" dirty="0"/>
-              <a:t>package contains mock implementations of the </a:t>
-            </a:r>
-            <a:r>
-              <a:rPr lang="en-US" dirty="0">
-                <a:latin typeface="Courier" pitchFamily="2" charset="0"/>
-              </a:rPr>
-              <a:t>Environment</a:t>
-            </a:r>
-            <a:r>
-              <a:rPr lang="en-US" dirty="0"/>
-              <a:t> and </a:t>
-            </a:r>
-            <a:r>
-              <a:rPr lang="en-US" dirty="0" err="1">
-                <a:latin typeface="Courier" pitchFamily="2" charset="0"/>
-              </a:rPr>
-              <a:t>PropertySource</a:t>
-            </a:r>
-            <a:r>
-              <a:rPr lang="en-US" dirty="0"/>
-              <a:t> abstractions. </a:t>
+              <a:t>ReflectionTestUtils</a:t>
+            </a:r>
+            <a:r>
+              <a:rPr lang="en-US" dirty="0"/>
+              <a:t> is a collection of reflection-based utility methods. </a:t>
+            </a:r>
+          </a:p>
+          <a:p>
+            <a:r>
+              <a:rPr lang="en-US" dirty="0"/>
+              <a:t>Use these methods in testing scenarios where you need to </a:t>
             </a:r>
           </a:p>
           <a:p>
             <a:pPr lvl="1"/>
             <a:r>
-              <a:rPr lang="en-US" dirty="0" err="1">
-                <a:latin typeface="Courier" pitchFamily="2" charset="0"/>
-              </a:rPr>
-              <a:t>MockEnvironment</a:t>
-            </a:r>
-            <a:r>
-              <a:rPr lang="en-US" dirty="0"/>
-              <a:t> and </a:t>
-            </a:r>
-            <a:r>
-              <a:rPr lang="en-US" dirty="0" err="1">
-                <a:latin typeface="Courier" pitchFamily="2" charset="0"/>
-              </a:rPr>
-              <a:t>MockPropertySource</a:t>
-            </a:r>
-            <a:r>
-              <a:rPr lang="en-US" dirty="0"/>
-              <a:t> are useful for developing out-of-container tests for code that depends on environment-specific properties.</a:t>
-            </a:r>
+              <a:rPr lang="en-US" dirty="0"/>
+              <a:t>change the value of a constant, </a:t>
+            </a:r>
+          </a:p>
+          <a:p>
+            <a:pPr lvl="1"/>
+            <a:r>
+              <a:rPr lang="en-US" dirty="0"/>
+              <a:t>set a non-public field, </a:t>
+            </a:r>
+          </a:p>
+          <a:p>
+            <a:pPr lvl="1"/>
+            <a:r>
+              <a:rPr lang="en-US" dirty="0"/>
+              <a:t>invoke a non-public setter method, </a:t>
+            </a:r>
+          </a:p>
+          <a:p>
+            <a:pPr lvl="1"/>
+            <a:r>
+              <a:rPr lang="en-US" dirty="0"/>
+              <a:t>or invoke a non-public configuration or lifecycle callback method </a:t>
+            </a:r>
+          </a:p>
+          <a:p>
+            <a:endParaRPr lang="en-US" dirty="0"/>
+          </a:p>
+          <a:p>
+            <a:endParaRPr lang="en-US" dirty="0"/>
           </a:p>
         </p:txBody>
       </p:sp>
     </p:spTree>
     <p:extLst>
       <p:ext uri="{BB962C8B-B14F-4D97-AF65-F5344CB8AC3E}">
-        <p14:creationId xmlns:p14="http://schemas.microsoft.com/office/powerpoint/2010/main" val="325043793"/>
+        <p14:creationId xmlns:p14="http://schemas.microsoft.com/office/powerpoint/2010/main" val="13085774"/>
       </p:ext>
     </p:extLst>
   </p:cSld>
@@ -3894,7 +4116,7 @@
           <p:cNvPr id="2" name="Title 1">
             <a:extLst>
               <a:ext uri="{FF2B5EF4-FFF2-40B4-BE49-F238E27FC236}">
-                <a16:creationId xmlns:a16="http://schemas.microsoft.com/office/drawing/2014/main" id="{BDB22E06-8907-5D47-AEE0-EFE4022FF600}"/>
+                <a16:creationId xmlns:a16="http://schemas.microsoft.com/office/drawing/2014/main" id="{93EEAAD8-965B-D247-BD6A-0A9D5FB06A6E}"/>
               </a:ext>
             </a:extLst>
           </p:cNvPr>
@@ -3911,9 +4133,10 @@
           <a:lstStyle/>
           <a:p>
             <a:r>
-              <a:rPr lang="en-US" dirty="0"/>
-              <a:t>Mock Servlet API support</a:t>
-            </a:r>
+              <a:rPr lang="en-US" dirty="0" err="1"/>
+              <a:t>AopTestUtils</a:t>
+            </a:r>
+            <a:endParaRPr lang="en-US" dirty="0"/>
           </a:p>
         </p:txBody>
       </p:sp>
@@ -3922,7 +4145,7 @@
           <p:cNvPr id="3" name="Content Placeholder 2">
             <a:extLst>
               <a:ext uri="{FF2B5EF4-FFF2-40B4-BE49-F238E27FC236}">
-                <a16:creationId xmlns:a16="http://schemas.microsoft.com/office/drawing/2014/main" id="{F51E78BE-4CA6-1A43-834B-CDBC31501506}"/>
+                <a16:creationId xmlns:a16="http://schemas.microsoft.com/office/drawing/2014/main" id="{60197950-7A54-D944-9B08-E27A20E34FFD}"/>
               </a:ext>
             </a:extLst>
           </p:cNvPr>
@@ -3935,80 +4158,79 @@
         </p:nvSpPr>
         <p:spPr/>
         <p:txBody>
-          <a:bodyPr>
-            <a:normAutofit/>
-          </a:bodyPr>
-          <a:lstStyle/>
-          <a:p>
-            <a:r>
-              <a:rPr lang="en-US" dirty="0"/>
-              <a:t>The </a:t>
-            </a:r>
+          <a:bodyPr/>
+          <a:lstStyle/>
+          <a:p>
             <a:r>
               <a:rPr lang="en-US" dirty="0" err="1">
                 <a:latin typeface="Courier" pitchFamily="2" charset="0"/>
               </a:rPr>
-              <a:t>org.springframework.mock.web</a:t>
-            </a:r>
-            <a:r>
-              <a:rPr lang="en-US" dirty="0">
+              <a:t>AopTestUtils</a:t>
+            </a:r>
+            <a:r>
+              <a:rPr lang="en-US" dirty="0"/>
+              <a:t> is a collection of AOP-related utility methods. </a:t>
+            </a:r>
+          </a:p>
+          <a:p>
+            <a:r>
+              <a:rPr lang="en-US" dirty="0"/>
+              <a:t>You can use these methods to obtain a reference to the underlying target object hidden behind one or more Spring proxies. </a:t>
+            </a:r>
+          </a:p>
+          <a:p>
+            <a:pPr lvl="1"/>
+            <a:r>
+              <a:rPr lang="en-US" dirty="0"/>
+              <a:t>For example, if you have configured a bean as a dynamic mock by using a library such as </a:t>
+            </a:r>
+            <a:r>
+              <a:rPr lang="en-US" dirty="0" err="1"/>
+              <a:t>EasyMock</a:t>
+            </a:r>
+            <a:r>
+              <a:rPr lang="en-US" dirty="0"/>
+              <a:t> or Mockito, and the mock is wrapped in a Spring proxy, you may need direct access to the underlying mock to configure expectations on it and perform verifications. </a:t>
+            </a:r>
+          </a:p>
+          <a:p>
+            <a:r>
+              <a:rPr lang="en-US" dirty="0"/>
+              <a:t>For Spring’s core AOP utilities, see </a:t>
+            </a:r>
+            <a:r>
+              <a:rPr lang="en-US" dirty="0" err="1">
                 <a:latin typeface="Courier" pitchFamily="2" charset="0"/>
               </a:rPr>
-              <a:t> </a:t>
-            </a:r>
-            <a:r>
-              <a:rPr lang="en-US" dirty="0"/>
-              <a:t>package contains a comprehensive set of Servlet API mock objects.</a:t>
-            </a:r>
-          </a:p>
-          <a:p>
-            <a:pPr lvl="1"/>
-            <a:r>
-              <a:rPr lang="en-US" dirty="0"/>
-              <a:t>Useful for testing web contexts, controllers and filters. </a:t>
-            </a:r>
-          </a:p>
-          <a:p>
-            <a:pPr lvl="1"/>
-            <a:r>
-              <a:rPr lang="en-US" dirty="0"/>
-              <a:t>These mock objects are targeted at usage with Spring’s Web MVC framework.</a:t>
-            </a:r>
-          </a:p>
-          <a:p>
-            <a:r>
-              <a:rPr lang="en-US" dirty="0"/>
-              <a:t>Since Spring Framework 5.0, these mock objects are based on the Servlet 4.0 API.</a:t>
-            </a:r>
-          </a:p>
-          <a:p>
-            <a:r>
-              <a:rPr lang="en-US" dirty="0"/>
-              <a:t>The Spring MVC Test Framework (</a:t>
-            </a:r>
-            <a:r>
-              <a:rPr lang="en-US" i="1" dirty="0"/>
-              <a:t>aka</a:t>
-            </a:r>
-            <a:r>
-              <a:rPr lang="en-US" dirty="0"/>
-              <a:t> </a:t>
-            </a:r>
-            <a:r>
-              <a:rPr lang="en-US" dirty="0" err="1"/>
-              <a:t>MockMvc</a:t>
-            </a:r>
-            <a:r>
-              <a:rPr lang="en-US" dirty="0"/>
-              <a:t>) builds on the mock Servlet API objects to provide an integration testing framework for Spring MVC.</a:t>
-            </a:r>
+              <a:t>AopUtils</a:t>
+            </a:r>
+            <a:r>
+              <a:rPr lang="en-US" dirty="0"/>
+              <a:t> and </a:t>
+            </a:r>
+            <a:r>
+              <a:rPr lang="en-US" dirty="0" err="1">
+                <a:latin typeface="Courier" pitchFamily="2" charset="0"/>
+              </a:rPr>
+              <a:t>AopProxyUtils</a:t>
+            </a:r>
+            <a:r>
+              <a:rPr lang="en-US" dirty="0"/>
+              <a:t>.</a:t>
+            </a:r>
+          </a:p>
+          <a:p>
+            <a:endParaRPr lang="en-US" dirty="0"/>
+          </a:p>
+          <a:p>
+            <a:endParaRPr lang="en-US" dirty="0"/>
           </a:p>
         </p:txBody>
       </p:sp>
     </p:spTree>
     <p:extLst>
       <p:ext uri="{BB962C8B-B14F-4D97-AF65-F5344CB8AC3E}">
-        <p14:creationId xmlns:p14="http://schemas.microsoft.com/office/powerpoint/2010/main" val="690069578"/>
+        <p14:creationId xmlns:p14="http://schemas.microsoft.com/office/powerpoint/2010/main" val="1717276562"/>
       </p:ext>
     </p:extLst>
   </p:cSld>
@@ -4040,7 +4262,7 @@
           <p:cNvPr id="2" name="Title 1">
             <a:extLst>
               <a:ext uri="{FF2B5EF4-FFF2-40B4-BE49-F238E27FC236}">
-                <a16:creationId xmlns:a16="http://schemas.microsoft.com/office/drawing/2014/main" id="{0ACB1337-375E-2245-A7F2-5ADAEF06D81E}"/>
+                <a16:creationId xmlns:a16="http://schemas.microsoft.com/office/drawing/2014/main" id="{BE059C70-14DB-9048-BAEE-8FCD59575F8F}"/>
               </a:ext>
             </a:extLst>
           </p:cNvPr>
@@ -4058,15 +4280,7 @@
           <a:p>
             <a:r>
               <a:rPr lang="en-US" dirty="0"/>
-              <a:t>Spring MVC Test framework (aka </a:t>
-            </a:r>
-            <a:r>
-              <a:rPr lang="en-US" dirty="0" err="1"/>
-              <a:t>MockMvc</a:t>
-            </a:r>
-            <a:r>
-              <a:rPr lang="en-US" dirty="0"/>
-              <a:t>)</a:t>
+              <a:t>Mock Environment support</a:t>
             </a:r>
           </a:p>
         </p:txBody>
@@ -4076,7 +4290,7 @@
           <p:cNvPr id="3" name="Content Placeholder 2">
             <a:extLst>
               <a:ext uri="{FF2B5EF4-FFF2-40B4-BE49-F238E27FC236}">
-                <a16:creationId xmlns:a16="http://schemas.microsoft.com/office/drawing/2014/main" id="{01CB3B59-9643-F348-A490-6422BCB91D84}"/>
+                <a16:creationId xmlns:a16="http://schemas.microsoft.com/office/drawing/2014/main" id="{528D3533-DB35-7C4B-A917-E784845190A3}"/>
               </a:ext>
             </a:extLst>
           </p:cNvPr>
@@ -4089,81 +4303,79 @@
         </p:nvSpPr>
         <p:spPr/>
         <p:txBody>
-          <a:bodyPr>
-            <a:normAutofit/>
-          </a:bodyPr>
-          <a:lstStyle/>
-          <a:p>
-            <a:r>
-              <a:rPr lang="en-US" dirty="0"/>
-              <a:t>Provides support for testing Spring MVC applications. </a:t>
+          <a:bodyPr/>
+          <a:lstStyle/>
+          <a:p>
+            <a:r>
+              <a:rPr lang="en-US" dirty="0"/>
+              <a:t>The </a:t>
+            </a:r>
+            <a:r>
+              <a:rPr lang="en-US" dirty="0" err="1">
+                <a:latin typeface="Courier" pitchFamily="2" charset="0"/>
+              </a:rPr>
+              <a:t>org.springframework.mock.env</a:t>
+            </a:r>
+            <a:r>
+              <a:rPr lang="en-US" dirty="0">
+                <a:latin typeface="Courier" pitchFamily="2" charset="0"/>
+              </a:rPr>
+              <a:t> </a:t>
+            </a:r>
+            <a:r>
+              <a:rPr lang="en-US" dirty="0"/>
+              <a:t>package contains mock implementations of the </a:t>
+            </a:r>
+            <a:r>
+              <a:rPr lang="en-US" dirty="0">
+                <a:latin typeface="Courier" pitchFamily="2" charset="0"/>
+              </a:rPr>
+              <a:t>Environment</a:t>
+            </a:r>
+            <a:r>
+              <a:rPr lang="en-US" dirty="0"/>
+              <a:t> and </a:t>
+            </a:r>
+            <a:r>
+              <a:rPr lang="en-US" dirty="0" err="1">
+                <a:latin typeface="Courier" pitchFamily="2" charset="0"/>
+              </a:rPr>
+              <a:t>PropertySource</a:t>
+            </a:r>
+            <a:r>
+              <a:rPr lang="en-US" dirty="0"/>
+              <a:t> abstractions. </a:t>
             </a:r>
           </a:p>
           <a:p>
             <a:pPr lvl="1"/>
             <a:r>
-              <a:rPr lang="en-US" dirty="0"/>
-              <a:t>It performs full Spring MVC request handling but via mock request and response objects instead of a running server.</a:t>
-            </a:r>
-          </a:p>
-          <a:p>
-            <a:r>
-              <a:rPr lang="en-US" dirty="0" err="1"/>
-              <a:t>MockMvc</a:t>
-            </a:r>
-            <a:r>
-              <a:rPr lang="en-US" dirty="0"/>
-              <a:t> can be used on its own to perform requests and verify responses. </a:t>
-            </a:r>
-          </a:p>
-          <a:p>
-            <a:r>
-              <a:rPr lang="en-US" dirty="0"/>
-              <a:t>It can also be used through the </a:t>
-            </a:r>
-            <a:r>
-              <a:rPr lang="en-US" dirty="0" err="1"/>
-              <a:t>WebTestClient</a:t>
-            </a:r>
-            <a:r>
-              <a:rPr lang="en-US" dirty="0"/>
-              <a:t> where </a:t>
-            </a:r>
-            <a:r>
-              <a:rPr lang="en-US" dirty="0" err="1"/>
-              <a:t>MockMvc</a:t>
-            </a:r>
-            <a:r>
-              <a:rPr lang="en-US" dirty="0"/>
-              <a:t> is plugged in as the server to handle requests with. </a:t>
-            </a:r>
-          </a:p>
-          <a:p>
-            <a:pPr lvl="1"/>
-            <a:r>
-              <a:rPr lang="en-US" dirty="0"/>
-              <a:t>Advantage: The option to work with higher level objects instead of raw data.</a:t>
-            </a:r>
-          </a:p>
-          <a:p>
-            <a:pPr lvl="1"/>
-            <a:r>
-              <a:rPr lang="en-US" dirty="0"/>
-              <a:t>Advantage: Use full, end-to-end HTTP tests against a live server and use the same test API.</a:t>
-            </a:r>
-          </a:p>
-          <a:p>
-            <a:endParaRPr lang="en-US" dirty="0"/>
-          </a:p>
-          <a:p>
-            <a:endParaRPr lang="en-US" dirty="0"/>
+              <a:rPr lang="en-US" dirty="0" err="1">
+                <a:latin typeface="Courier" pitchFamily="2" charset="0"/>
+              </a:rPr>
+              <a:t>MockEnvironment</a:t>
+            </a:r>
+            <a:r>
+              <a:rPr lang="en-US" dirty="0"/>
+              <a:t> and </a:t>
+            </a:r>
+            <a:r>
+              <a:rPr lang="en-US" dirty="0" err="1">
+                <a:latin typeface="Courier" pitchFamily="2" charset="0"/>
+              </a:rPr>
+              <a:t>MockPropertySource</a:t>
+            </a:r>
+            <a:r>
+              <a:rPr lang="en-US" dirty="0"/>
+              <a:t> are useful for developing out-of-container tests for code that depends on environment-specific properties.</a:t>
+            </a:r>
           </a:p>
         </p:txBody>
       </p:sp>
     </p:spTree>
     <p:extLst>
       <p:ext uri="{BB962C8B-B14F-4D97-AF65-F5344CB8AC3E}">
-        <p14:creationId xmlns:p14="http://schemas.microsoft.com/office/powerpoint/2010/main" val="3431082857"/>
+        <p14:creationId xmlns:p14="http://schemas.microsoft.com/office/powerpoint/2010/main" val="325043793"/>
       </p:ext>
     </p:extLst>
   </p:cSld>
@@ -4195,7 +4407,7 @@
           <p:cNvPr id="2" name="Title 1">
             <a:extLst>
               <a:ext uri="{FF2B5EF4-FFF2-40B4-BE49-F238E27FC236}">
-                <a16:creationId xmlns:a16="http://schemas.microsoft.com/office/drawing/2014/main" id="{3D8AD980-BEFA-BA45-BA79-2E3EE8AA0ECF}"/>
+                <a16:creationId xmlns:a16="http://schemas.microsoft.com/office/drawing/2014/main" id="{BDB22E06-8907-5D47-AEE0-EFE4022FF600}"/>
               </a:ext>
             </a:extLst>
           </p:cNvPr>
@@ -4212,12 +4424,8 @@
           <a:lstStyle/>
           <a:p>
             <a:r>
-              <a:rPr lang="en-US" dirty="0" err="1"/>
-              <a:t>MockMvc</a:t>
-            </a:r>
-            <a:r>
-              <a:rPr lang="en-US" dirty="0"/>
-              <a:t> Details</a:t>
+              <a:rPr lang="en-US" dirty="0"/>
+              <a:t>Mock Servlet API support</a:t>
             </a:r>
           </a:p>
         </p:txBody>
@@ -4227,7 +4435,7 @@
           <p:cNvPr id="3" name="Content Placeholder 2">
             <a:extLst>
               <a:ext uri="{FF2B5EF4-FFF2-40B4-BE49-F238E27FC236}">
-                <a16:creationId xmlns:a16="http://schemas.microsoft.com/office/drawing/2014/main" id="{EFC440CD-5D93-D246-BC4D-08A4EE439B45}"/>
+                <a16:creationId xmlns:a16="http://schemas.microsoft.com/office/drawing/2014/main" id="{F51E78BE-4CA6-1A43-834B-CDBC31501506}"/>
               </a:ext>
             </a:extLst>
           </p:cNvPr>
@@ -4240,50 +4448,80 @@
         </p:nvSpPr>
         <p:spPr/>
         <p:txBody>
-          <a:bodyPr/>
-          <a:lstStyle/>
-          <a:p>
-            <a:r>
-              <a:rPr lang="en-US" dirty="0"/>
-              <a:t>Invokes the </a:t>
+          <a:bodyPr>
+            <a:normAutofit/>
+          </a:bodyPr>
+          <a:lstStyle/>
+          <a:p>
+            <a:r>
+              <a:rPr lang="en-US" dirty="0"/>
+              <a:t>The </a:t>
             </a:r>
             <a:r>
               <a:rPr lang="en-US" dirty="0" err="1">
                 <a:latin typeface="Courier" pitchFamily="2" charset="0"/>
               </a:rPr>
-              <a:t>DispacherServlet</a:t>
-            </a:r>
-            <a:r>
-              <a:rPr lang="en-US" dirty="0"/>
-              <a:t>, passing mock implementations of the Servlet API from the spring-test module.</a:t>
+              <a:t>org.springframework.mock.web</a:t>
+            </a:r>
+            <a:r>
+              <a:rPr lang="en-US" dirty="0">
+                <a:latin typeface="Courier" pitchFamily="2" charset="0"/>
+              </a:rPr>
+              <a:t> </a:t>
+            </a:r>
+            <a:r>
+              <a:rPr lang="en-US" dirty="0"/>
+              <a:t>package contains a comprehensive set of Servlet API mock objects.</a:t>
             </a:r>
           </a:p>
           <a:p>
             <a:pPr lvl="1"/>
             <a:r>
               <a:rPr lang="en-US" dirty="0"/>
-              <a:t>Replicates the full Spring MVC request handling without a running server.</a:t>
-            </a:r>
-          </a:p>
-          <a:p>
+              <a:t>Useful for testing web contexts, controllers and filters. </a:t>
+            </a:r>
+          </a:p>
+          <a:p>
+            <a:pPr lvl="1"/>
+            <a:r>
+              <a:rPr lang="en-US" dirty="0"/>
+              <a:t>These mock objects are targeted at usage with Spring’s Web MVC framework.</a:t>
+            </a:r>
+          </a:p>
+          <a:p>
+            <a:r>
+              <a:rPr lang="en-US" dirty="0"/>
+              <a:t>Since Spring Framework 5.0, these mock objects are based on the Servlet 4.0 API.</a:t>
+            </a:r>
+          </a:p>
+          <a:p>
+            <a:r>
+              <a:rPr lang="en-US" dirty="0"/>
+              <a:t>The Spring MVC Test Framework (</a:t>
+            </a:r>
+            <a:r>
+              <a:rPr lang="en-US" i="1" dirty="0"/>
+              <a:t>aka</a:t>
+            </a:r>
+            <a:r>
+              <a:rPr lang="en-US" dirty="0"/>
+              <a:t> </a:t>
+            </a:r>
             <a:r>
               <a:rPr lang="en-US" dirty="0" err="1"/>
               <a:t>MockMvc</a:t>
             </a:r>
             <a:r>
               <a:rPr lang="en-US" dirty="0"/>
-              <a:t> is a server-side test framework that lets you verify most of the functionality of a Spring MVC application using lightweight and targeted tests. </a:t>
-            </a:r>
-          </a:p>
-          <a:p>
-            <a:endParaRPr lang="en-US" dirty="0"/>
+              <a:t>) builds on the mock Servlet API objects to provide an integration testing framework for Spring MVC.</a:t>
+            </a:r>
           </a:p>
         </p:txBody>
       </p:sp>
     </p:spTree>
     <p:extLst>
       <p:ext uri="{BB962C8B-B14F-4D97-AF65-F5344CB8AC3E}">
-        <p14:creationId xmlns:p14="http://schemas.microsoft.com/office/powerpoint/2010/main" val="3033223310"/>
+        <p14:creationId xmlns:p14="http://schemas.microsoft.com/office/powerpoint/2010/main" val="690069578"/>
       </p:ext>
     </p:extLst>
   </p:cSld>
@@ -4315,7 +4553,7 @@
           <p:cNvPr id="2" name="Title 1">
             <a:extLst>
               <a:ext uri="{FF2B5EF4-FFF2-40B4-BE49-F238E27FC236}">
-                <a16:creationId xmlns:a16="http://schemas.microsoft.com/office/drawing/2014/main" id="{86C860B7-32F1-AE46-8944-4BDA7C647312}"/>
+                <a16:creationId xmlns:a16="http://schemas.microsoft.com/office/drawing/2014/main" id="{0ACB1337-375E-2245-A7F2-5ADAEF06D81E}"/>
               </a:ext>
             </a:extLst>
           </p:cNvPr>
@@ -4333,7 +4571,15 @@
           <a:p>
             <a:r>
               <a:rPr lang="en-US" dirty="0"/>
-              <a:t>Spring Web Reactive</a:t>
+              <a:t>Spring MVC testing (aka </a:t>
+            </a:r>
+            <a:r>
+              <a:rPr lang="en-US" dirty="0" err="1"/>
+              <a:t>MockMvc</a:t>
+            </a:r>
+            <a:r>
+              <a:rPr lang="en-US" dirty="0"/>
+              <a:t>)</a:t>
             </a:r>
           </a:p>
         </p:txBody>
@@ -4343,7 +4589,7 @@
           <p:cNvPr id="3" name="Content Placeholder 2">
             <a:extLst>
               <a:ext uri="{FF2B5EF4-FFF2-40B4-BE49-F238E27FC236}">
-                <a16:creationId xmlns:a16="http://schemas.microsoft.com/office/drawing/2014/main" id="{52E68A71-BC17-5D4F-BC93-8B7E374EBDDC}"/>
+                <a16:creationId xmlns:a16="http://schemas.microsoft.com/office/drawing/2014/main" id="{01CB3B59-9643-F348-A490-6422BCB91D84}"/>
               </a:ext>
             </a:extLst>
           </p:cNvPr>
@@ -4357,151 +4603,80 @@
         <p:spPr/>
         <p:txBody>
           <a:bodyPr>
-            <a:normAutofit fontScale="92500" lnSpcReduction="10000"/>
+            <a:normAutofit/>
           </a:bodyPr>
           <a:lstStyle/>
           <a:p>
             <a:r>
               <a:rPr lang="en-US" dirty="0"/>
-              <a:t>The mock implementations of </a:t>
-            </a:r>
-            <a:r>
-              <a:rPr lang="en-US" dirty="0" err="1">
-                <a:latin typeface="Courier" pitchFamily="2" charset="0"/>
-              </a:rPr>
-              <a:t>ServerHttpRequest</a:t>
-            </a:r>
-            <a:r>
-              <a:rPr lang="en-US" dirty="0"/>
-              <a:t> and </a:t>
-            </a:r>
-            <a:r>
-              <a:rPr lang="en-US" dirty="0" err="1">
-                <a:latin typeface="Courier" pitchFamily="2" charset="0"/>
-              </a:rPr>
-              <a:t>ServerHttpResponse</a:t>
-            </a:r>
-            <a:r>
-              <a:rPr lang="en-US" dirty="0"/>
-              <a:t> are provided for testing </a:t>
-            </a:r>
+              <a:t>Provides support for testing Spring MVC applications. </a:t>
+            </a:r>
+          </a:p>
+          <a:p>
+            <a:pPr lvl="1"/>
+            <a:r>
+              <a:rPr lang="en-US" dirty="0"/>
+              <a:t>It performs full Spring MVC request handling but via mock request and response objects instead of a running server.</a:t>
+            </a:r>
+          </a:p>
+          <a:p>
             <a:r>
               <a:rPr lang="en-US" dirty="0" err="1"/>
-              <a:t>WebFlux</a:t>
-            </a:r>
-            <a:r>
-              <a:rPr lang="en-US" dirty="0"/>
-              <a:t> applications are provided in the </a:t>
-            </a:r>
-            <a:r>
-              <a:rPr lang="en-US" dirty="0" err="1">
-                <a:latin typeface="Courier" pitchFamily="2" charset="0"/>
-              </a:rPr>
-              <a:t>org.springframework.mock.http.server.reactive</a:t>
-            </a:r>
-            <a:r>
-              <a:rPr lang="en-US" dirty="0">
-                <a:latin typeface="Courier" pitchFamily="2" charset="0"/>
-              </a:rPr>
-              <a:t> </a:t>
-            </a:r>
-            <a:r>
-              <a:rPr lang="en-US" dirty="0"/>
-              <a:t>package. </a:t>
+              <a:t>MockMvc</a:t>
+            </a:r>
+            <a:r>
+              <a:rPr lang="en-US" dirty="0"/>
+              <a:t> can be used on its own to perform requests and verify responses. </a:t>
+            </a:r>
+          </a:p>
+          <a:p>
+            <a:r>
+              <a:rPr lang="en-US" dirty="0"/>
+              <a:t>It can also be used through the </a:t>
+            </a:r>
+            <a:r>
+              <a:rPr lang="en-US" dirty="0" err="1"/>
+              <a:t>WebTestClient</a:t>
+            </a:r>
+            <a:r>
+              <a:rPr lang="en-US" dirty="0"/>
+              <a:t> where </a:t>
+            </a:r>
+            <a:r>
+              <a:rPr lang="en-US" dirty="0" err="1"/>
+              <a:t>MockMvc</a:t>
+            </a:r>
+            <a:r>
+              <a:rPr lang="en-US" dirty="0"/>
+              <a:t> is plugged in as the server to handle requests with. </a:t>
             </a:r>
           </a:p>
           <a:p>
             <a:pPr lvl="1"/>
             <a:r>
               <a:rPr lang="en-US" dirty="0"/>
-              <a:t>The </a:t>
-            </a:r>
-            <a:r>
-              <a:rPr lang="en-US" dirty="0" err="1">
-                <a:latin typeface="Courier" pitchFamily="2" charset="0"/>
-              </a:rPr>
-              <a:t>org.springframework.mock.web.server</a:t>
-            </a:r>
-            <a:r>
-              <a:rPr lang="en-US" dirty="0">
-                <a:latin typeface="Courier" pitchFamily="2" charset="0"/>
-              </a:rPr>
-              <a:t> </a:t>
-            </a:r>
-            <a:r>
-              <a:rPr lang="en-US" dirty="0"/>
-              <a:t>package contains a mock </a:t>
-            </a:r>
-            <a:r>
-              <a:rPr lang="en-US" dirty="0" err="1">
-                <a:latin typeface="Courier" pitchFamily="2" charset="0"/>
-              </a:rPr>
-              <a:t>ServerWebExchange</a:t>
-            </a:r>
-            <a:r>
-              <a:rPr lang="en-US" dirty="0"/>
-              <a:t> that depends on those mock implementations.</a:t>
-            </a:r>
-          </a:p>
-          <a:p>
-            <a:r>
-              <a:rPr lang="en-US" dirty="0"/>
-              <a:t>Both </a:t>
-            </a:r>
-            <a:r>
-              <a:rPr lang="en-US" dirty="0" err="1">
-                <a:latin typeface="Courier" pitchFamily="2" charset="0"/>
-              </a:rPr>
-              <a:t>MockServerHttpRequest</a:t>
-            </a:r>
-            <a:r>
-              <a:rPr lang="en-US" dirty="0"/>
-              <a:t> and </a:t>
-            </a:r>
-            <a:r>
-              <a:rPr lang="en-US" dirty="0" err="1">
-                <a:latin typeface="Courier" pitchFamily="2" charset="0"/>
-              </a:rPr>
-              <a:t>MockServerHttpResponse</a:t>
-            </a:r>
-            <a:r>
-              <a:rPr lang="en-US" dirty="0"/>
-              <a:t> extend from the same abstract base classes as server-specific implementations and share behavior with them. </a:t>
+              <a:t>Advantage: The option to work with higher level objects instead of raw data.</a:t>
             </a:r>
           </a:p>
           <a:p>
             <a:pPr lvl="1"/>
             <a:r>
               <a:rPr lang="en-US" dirty="0"/>
-              <a:t>For example, a mock request is immutable once created, but you can use the </a:t>
-            </a:r>
-            <a:r>
-              <a:rPr lang="en-US" dirty="0">
-                <a:latin typeface="Courier" pitchFamily="2" charset="0"/>
-              </a:rPr>
-              <a:t>mutate()</a:t>
-            </a:r>
-            <a:r>
-              <a:rPr lang="en-US" dirty="0"/>
-              <a:t> method from </a:t>
-            </a:r>
-            <a:r>
-              <a:rPr lang="en-US" dirty="0" err="1">
-                <a:latin typeface="Courier" pitchFamily="2" charset="0"/>
-              </a:rPr>
-              <a:t>ServerHttpRequest</a:t>
-            </a:r>
-            <a:r>
-              <a:rPr lang="en-US" dirty="0"/>
-              <a:t> to create a modified instance.</a:t>
-            </a:r>
+              <a:t>Advantage: Use full, end-to-end HTTP tests against a live server and use the same test API.</a:t>
+            </a:r>
+          </a:p>
+          <a:p>
+            <a:endParaRPr lang="en-US" dirty="0"/>
+          </a:p>
+          <a:p>
+            <a:endParaRPr lang="en-US" dirty="0"/>
           </a:p>
         </p:txBody>
       </p:sp>
     </p:spTree>
     <p:extLst>
       <p:ext uri="{BB962C8B-B14F-4D97-AF65-F5344CB8AC3E}">
-        <p14:creationId xmlns:p14="http://schemas.microsoft.com/office/powerpoint/2010/main" val="3096622250"/>
+        <p14:creationId xmlns:p14="http://schemas.microsoft.com/office/powerpoint/2010/main" val="3431082857"/>
       </p:ext>
     </p:extLst>
   </p:cSld>
@@ -4533,7 +4708,7 @@
           <p:cNvPr id="2" name="Title 1">
             <a:extLst>
               <a:ext uri="{FF2B5EF4-FFF2-40B4-BE49-F238E27FC236}">
-                <a16:creationId xmlns:a16="http://schemas.microsoft.com/office/drawing/2014/main" id="{0721C84B-4C4A-C94C-8F18-7F1C16D2A1F4}"/>
+                <a16:creationId xmlns:a16="http://schemas.microsoft.com/office/drawing/2014/main" id="{3D8AD980-BEFA-BA45-BA79-2E3EE8AA0ECF}"/>
               </a:ext>
             </a:extLst>
           </p:cNvPr>
@@ -4550,8 +4725,12 @@
           <a:lstStyle/>
           <a:p>
             <a:r>
-              <a:rPr lang="en-US" dirty="0"/>
-              <a:t>Spring Web Reactive</a:t>
+              <a:rPr lang="en-US" dirty="0" err="1"/>
+              <a:t>MockMvc</a:t>
+            </a:r>
+            <a:r>
+              <a:rPr lang="en-US" dirty="0"/>
+              <a:t> Details</a:t>
             </a:r>
           </a:p>
         </p:txBody>
@@ -4561,7 +4740,7 @@
           <p:cNvPr id="3" name="Content Placeholder 2">
             <a:extLst>
               <a:ext uri="{FF2B5EF4-FFF2-40B4-BE49-F238E27FC236}">
-                <a16:creationId xmlns:a16="http://schemas.microsoft.com/office/drawing/2014/main" id="{145FAC0A-9F40-C942-9675-DED9A8D58FF7}"/>
+                <a16:creationId xmlns:a16="http://schemas.microsoft.com/office/drawing/2014/main" id="{EFC440CD-5D93-D246-BC4D-08A4EE439B45}"/>
               </a:ext>
             </a:extLst>
           </p:cNvPr>
@@ -4579,57 +4758,35 @@
           <a:p>
             <a:r>
               <a:rPr lang="en-US" dirty="0"/>
-              <a:t>In order for the mock response to properly implement the write contract and return a write completion handle (that is, Mono&lt;Void&gt;), it by default uses a Flux with cache().then(), which buffers the data and makes it available for assertions in tests</a:t>
-            </a:r>
-            <a:r>
-              <a:rPr lang="en-US"/>
-              <a:t>. </a:t>
-            </a:r>
-          </a:p>
-          <a:p>
-            <a:pPr lvl="1"/>
-            <a:r>
-              <a:rPr lang="en-US"/>
-              <a:t>Applications </a:t>
-            </a:r>
-            <a:r>
-              <a:rPr lang="en-US" dirty="0"/>
-              <a:t>can set a custom write function (for example, to test an infinite stream).</a:t>
-            </a:r>
-          </a:p>
-          <a:p>
-            <a:r>
-              <a:rPr lang="en-US" dirty="0"/>
-              <a:t>The </a:t>
+              <a:t>Invokes the </a:t>
             </a:r>
             <a:r>
               <a:rPr lang="en-US" dirty="0" err="1">
                 <a:latin typeface="Courier" pitchFamily="2" charset="0"/>
               </a:rPr>
-              <a:t>WebTestClient</a:t>
-            </a:r>
-            <a:r>
-              <a:rPr lang="en-US" dirty="0"/>
-              <a:t> builds on the mock request and response to provide support for testing </a:t>
-            </a:r>
+              <a:t>DispacherServlet</a:t>
+            </a:r>
+            <a:r>
+              <a:rPr lang="en-US" dirty="0"/>
+              <a:t>, passing mock implementations of the Servlet API from the spring-test module.</a:t>
+            </a:r>
+          </a:p>
+          <a:p>
+            <a:pPr lvl="1"/>
+            <a:r>
+              <a:rPr lang="en-US" dirty="0"/>
+              <a:t>Replicates the full Spring MVC request handling without a running server.</a:t>
+            </a:r>
+          </a:p>
+          <a:p>
             <a:r>
               <a:rPr lang="en-US" dirty="0" err="1"/>
-              <a:t>WebFlux</a:t>
-            </a:r>
-            <a:r>
-              <a:rPr lang="en-US" dirty="0"/>
-              <a:t> applications without an HTTP server. </a:t>
-            </a:r>
-          </a:p>
-          <a:p>
-            <a:pPr lvl="1"/>
-            <a:r>
-              <a:rPr lang="en-US" dirty="0"/>
-              <a:t>The client can also be used for end-to-end tests with a running server.</a:t>
-            </a:r>
-          </a:p>
-          <a:p>
-            <a:endParaRPr lang="en-US" dirty="0"/>
+              <a:t>MockMvc</a:t>
+            </a:r>
+            <a:r>
+              <a:rPr lang="en-US" dirty="0"/>
+              <a:t> is a server-side test framework that lets you verify most of the functionality of a Spring MVC application using lightweight and targeted tests. </a:t>
+            </a:r>
           </a:p>
           <a:p>
             <a:endParaRPr lang="en-US" dirty="0"/>
@@ -4639,7 +4796,7 @@
     </p:spTree>
     <p:extLst>
       <p:ext uri="{BB962C8B-B14F-4D97-AF65-F5344CB8AC3E}">
-        <p14:creationId xmlns:p14="http://schemas.microsoft.com/office/powerpoint/2010/main" val="3851587936"/>
+        <p14:creationId xmlns:p14="http://schemas.microsoft.com/office/powerpoint/2010/main" val="3033223310"/>
       </p:ext>
     </p:extLst>
   </p:cSld>
@@ -4671,7 +4828,7 @@
           <p:cNvPr id="2" name="Title 1">
             <a:extLst>
               <a:ext uri="{FF2B5EF4-FFF2-40B4-BE49-F238E27FC236}">
-                <a16:creationId xmlns:a16="http://schemas.microsoft.com/office/drawing/2014/main" id="{0721C84B-4C4A-C94C-8F18-7F1C16D2A1F4}"/>
+                <a16:creationId xmlns:a16="http://schemas.microsoft.com/office/drawing/2014/main" id="{C7E18CE5-FF41-8F4C-B4D8-3369360AA74C}"/>
               </a:ext>
             </a:extLst>
           </p:cNvPr>
@@ -4687,7 +4844,11 @@
           <a:bodyPr/>
           <a:lstStyle/>
           <a:p>
-            <a:endParaRPr lang="en-US"/>
+            <a:r>
+              <a:rPr lang="en-US" dirty="0" err="1"/>
+              <a:t>ModelAndViewAssert</a:t>
+            </a:r>
+            <a:endParaRPr lang="en-US" dirty="0"/>
           </a:p>
         </p:txBody>
       </p:sp>
@@ -4696,7 +4857,7 @@
           <p:cNvPr id="3" name="Content Placeholder 2">
             <a:extLst>
               <a:ext uri="{FF2B5EF4-FFF2-40B4-BE49-F238E27FC236}">
-                <a16:creationId xmlns:a16="http://schemas.microsoft.com/office/drawing/2014/main" id="{145FAC0A-9F40-C942-9675-DED9A8D58FF7}"/>
+                <a16:creationId xmlns:a16="http://schemas.microsoft.com/office/drawing/2014/main" id="{9B09F3D5-1FC0-CB47-A155-95418F5FAC50}"/>
               </a:ext>
             </a:extLst>
           </p:cNvPr>
@@ -4712,14 +4873,56 @@
           <a:bodyPr/>
           <a:lstStyle/>
           <a:p>
-            <a:endParaRPr lang="en-US"/>
+            <a:r>
+              <a:rPr lang="en-US" dirty="0"/>
+              <a:t>Use in combination with JUnit testing framework for unit tests that deal with Spring MVC </a:t>
+            </a:r>
+            <a:r>
+              <a:rPr lang="en-US" dirty="0" err="1">
+                <a:latin typeface="Courier" pitchFamily="2" charset="0"/>
+              </a:rPr>
+              <a:t>ModelAndView</a:t>
+            </a:r>
+            <a:r>
+              <a:rPr lang="en-US" dirty="0"/>
+              <a:t> objects.</a:t>
+            </a:r>
+          </a:p>
+          <a:p>
+            <a:r>
+              <a:rPr lang="en-US" dirty="0"/>
+              <a:t>A collection of assertions intended to simplify testing scenarios dealing with Spring Web MVC </a:t>
+            </a:r>
+            <a:r>
+              <a:rPr lang="en-US" dirty="0" err="1"/>
+              <a:t>ModelAndView</a:t>
+            </a:r>
+            <a:r>
+              <a:rPr lang="en-US" dirty="0"/>
+              <a:t> objects.</a:t>
+            </a:r>
+          </a:p>
+          <a:p>
+            <a:r>
+              <a:rPr lang="en-US" dirty="0"/>
+              <a:t>Part of the </a:t>
+            </a:r>
+            <a:r>
+              <a:rPr lang="en-US" dirty="0" err="1"/>
+              <a:t>org.springframework.test.web</a:t>
+            </a:r>
+            <a:r>
+              <a:rPr lang="en-US"/>
+              <a:t> package.</a:t>
+            </a:r>
+            <a:endParaRPr lang="en-US" dirty="0"/>
           </a:p>
         </p:txBody>
       </p:sp>
     </p:spTree>
     <p:extLst>
       <p:ext uri="{BB962C8B-B14F-4D97-AF65-F5344CB8AC3E}">
-        <p14:creationId xmlns:p14="http://schemas.microsoft.com/office/powerpoint/2010/main" val="13085774"/>
+        <p14:creationId xmlns:p14="http://schemas.microsoft.com/office/powerpoint/2010/main" val="1538373323"/>
       </p:ext>
     </p:extLst>
   </p:cSld>
@@ -4751,7 +4954,7 @@
           <p:cNvPr id="2" name="Title 1">
             <a:extLst>
               <a:ext uri="{FF2B5EF4-FFF2-40B4-BE49-F238E27FC236}">
-                <a16:creationId xmlns:a16="http://schemas.microsoft.com/office/drawing/2014/main" id="{0721C84B-4C4A-C94C-8F18-7F1C16D2A1F4}"/>
+                <a16:creationId xmlns:a16="http://schemas.microsoft.com/office/drawing/2014/main" id="{86C860B7-32F1-AE46-8944-4BDA7C647312}"/>
               </a:ext>
             </a:extLst>
           </p:cNvPr>
@@ -4767,7 +4970,10 @@
           <a:bodyPr/>
           <a:lstStyle/>
           <a:p>
-            <a:endParaRPr lang="en-US"/>
+            <a:r>
+              <a:rPr lang="en-US" dirty="0"/>
+              <a:t>Spring Web Reactive</a:t>
+            </a:r>
           </a:p>
         </p:txBody>
       </p:sp>
@@ -4776,7 +4982,7 @@
           <p:cNvPr id="3" name="Content Placeholder 2">
             <a:extLst>
               <a:ext uri="{FF2B5EF4-FFF2-40B4-BE49-F238E27FC236}">
-                <a16:creationId xmlns:a16="http://schemas.microsoft.com/office/drawing/2014/main" id="{145FAC0A-9F40-C942-9675-DED9A8D58FF7}"/>
+                <a16:creationId xmlns:a16="http://schemas.microsoft.com/office/drawing/2014/main" id="{52E68A71-BC17-5D4F-BC93-8B7E374EBDDC}"/>
               </a:ext>
             </a:extLst>
           </p:cNvPr>
@@ -4789,17 +4995,152 @@
         </p:nvSpPr>
         <p:spPr/>
         <p:txBody>
-          <a:bodyPr/>
-          <a:lstStyle/>
-          <a:p>
-            <a:endParaRPr lang="en-US"/>
+          <a:bodyPr>
+            <a:normAutofit fontScale="92500" lnSpcReduction="10000"/>
+          </a:bodyPr>
+          <a:lstStyle/>
+          <a:p>
+            <a:r>
+              <a:rPr lang="en-US" dirty="0"/>
+              <a:t>The mock implementations of </a:t>
+            </a:r>
+            <a:r>
+              <a:rPr lang="en-US" dirty="0" err="1">
+                <a:latin typeface="Courier" pitchFamily="2" charset="0"/>
+              </a:rPr>
+              <a:t>ServerHttpRequest</a:t>
+            </a:r>
+            <a:r>
+              <a:rPr lang="en-US" dirty="0"/>
+              <a:t> and </a:t>
+            </a:r>
+            <a:r>
+              <a:rPr lang="en-US" dirty="0" err="1">
+                <a:latin typeface="Courier" pitchFamily="2" charset="0"/>
+              </a:rPr>
+              <a:t>ServerHttpResponse</a:t>
+            </a:r>
+            <a:r>
+              <a:rPr lang="en-US" dirty="0"/>
+              <a:t> are provided for testing </a:t>
+            </a:r>
+            <a:r>
+              <a:rPr lang="en-US" dirty="0" err="1"/>
+              <a:t>WebFlux</a:t>
+            </a:r>
+            <a:r>
+              <a:rPr lang="en-US" dirty="0"/>
+              <a:t> applications are provided in the </a:t>
+            </a:r>
+            <a:r>
+              <a:rPr lang="en-US" dirty="0" err="1">
+                <a:latin typeface="Courier" pitchFamily="2" charset="0"/>
+              </a:rPr>
+              <a:t>org.springframework.mock.http.server.reactive</a:t>
+            </a:r>
+            <a:r>
+              <a:rPr lang="en-US" dirty="0">
+                <a:latin typeface="Courier" pitchFamily="2" charset="0"/>
+              </a:rPr>
+              <a:t> </a:t>
+            </a:r>
+            <a:r>
+              <a:rPr lang="en-US" dirty="0"/>
+              <a:t>package. </a:t>
+            </a:r>
+          </a:p>
+          <a:p>
+            <a:pPr lvl="1"/>
+            <a:r>
+              <a:rPr lang="en-US" dirty="0"/>
+              <a:t>The </a:t>
+            </a:r>
+            <a:r>
+              <a:rPr lang="en-US" dirty="0" err="1">
+                <a:latin typeface="Courier" pitchFamily="2" charset="0"/>
+              </a:rPr>
+              <a:t>org.springframework.mock.web.server</a:t>
+            </a:r>
+            <a:r>
+              <a:rPr lang="en-US" dirty="0">
+                <a:latin typeface="Courier" pitchFamily="2" charset="0"/>
+              </a:rPr>
+              <a:t> </a:t>
+            </a:r>
+            <a:r>
+              <a:rPr lang="en-US" dirty="0"/>
+              <a:t>package contains a mock </a:t>
+            </a:r>
+            <a:r>
+              <a:rPr lang="en-US" dirty="0" err="1">
+                <a:latin typeface="Courier" pitchFamily="2" charset="0"/>
+              </a:rPr>
+              <a:t>ServerWebExchange</a:t>
+            </a:r>
+            <a:r>
+              <a:rPr lang="en-US" dirty="0"/>
+              <a:t> that depends on those mock implementations.</a:t>
+            </a:r>
+          </a:p>
+          <a:p>
+            <a:r>
+              <a:rPr lang="en-US" dirty="0"/>
+              <a:t>Both </a:t>
+            </a:r>
+            <a:r>
+              <a:rPr lang="en-US" dirty="0" err="1">
+                <a:latin typeface="Courier" pitchFamily="2" charset="0"/>
+              </a:rPr>
+              <a:t>MockServerHttpRequest</a:t>
+            </a:r>
+            <a:r>
+              <a:rPr lang="en-US" dirty="0"/>
+              <a:t> and </a:t>
+            </a:r>
+            <a:r>
+              <a:rPr lang="en-US" dirty="0" err="1">
+                <a:latin typeface="Courier" pitchFamily="2" charset="0"/>
+              </a:rPr>
+              <a:t>MockServerHttpResponse</a:t>
+            </a:r>
+            <a:r>
+              <a:rPr lang="en-US" dirty="0"/>
+              <a:t> extend from the same abstract base classes as server-specific implementations and share behavior with them. </a:t>
+            </a:r>
+          </a:p>
+          <a:p>
+            <a:pPr lvl="1"/>
+            <a:r>
+              <a:rPr lang="en-US" dirty="0"/>
+              <a:t>For example, a mock request is immutable once created, but you can use the </a:t>
+            </a:r>
+            <a:r>
+              <a:rPr lang="en-US" dirty="0">
+                <a:latin typeface="Courier" pitchFamily="2" charset="0"/>
+              </a:rPr>
+              <a:t>mutate()</a:t>
+            </a:r>
+            <a:r>
+              <a:rPr lang="en-US" dirty="0"/>
+              <a:t> method from </a:t>
+            </a:r>
+            <a:r>
+              <a:rPr lang="en-US" dirty="0" err="1">
+                <a:latin typeface="Courier" pitchFamily="2" charset="0"/>
+              </a:rPr>
+              <a:t>ServerHttpRequest</a:t>
+            </a:r>
+            <a:r>
+              <a:rPr lang="en-US" dirty="0"/>
+              <a:t> to create a modified instance.</a:t>
+            </a:r>
           </a:p>
         </p:txBody>
       </p:sp>
     </p:spTree>
     <p:extLst>
       <p:ext uri="{BB962C8B-B14F-4D97-AF65-F5344CB8AC3E}">
-        <p14:creationId xmlns:p14="http://schemas.microsoft.com/office/powerpoint/2010/main" val="1337207298"/>
+        <p14:creationId xmlns:p14="http://schemas.microsoft.com/office/powerpoint/2010/main" val="3096622250"/>
       </p:ext>
     </p:extLst>
   </p:cSld>

</xml_diff>